<commit_message>
Edit core and add to how to usrp
</commit_message>
<xml_diff>
--- a/info/how-to-usrp.pptx
+++ b/info/how-to-usrp.pptx
@@ -5,7 +5,7 @@
     <p:sldMasterId id="2147483648" r:id="rId1"/>
   </p:sldMasterIdLst>
   <p:notesMasterIdLst>
-    <p:notesMasterId r:id="rId22"/>
+    <p:notesMasterId r:id="rId28"/>
   </p:notesMasterIdLst>
   <p:sldIdLst>
     <p:sldId id="256" r:id="rId2"/>
@@ -19,15 +19,21 @@
     <p:sldId id="335" r:id="rId10"/>
     <p:sldId id="332" r:id="rId11"/>
     <p:sldId id="336" r:id="rId12"/>
-    <p:sldId id="337" r:id="rId13"/>
-    <p:sldId id="338" r:id="rId14"/>
-    <p:sldId id="339" r:id="rId15"/>
-    <p:sldId id="341" r:id="rId16"/>
-    <p:sldId id="342" r:id="rId17"/>
-    <p:sldId id="343" r:id="rId18"/>
-    <p:sldId id="331" r:id="rId19"/>
-    <p:sldId id="340" r:id="rId20"/>
-    <p:sldId id="322" r:id="rId21"/>
+    <p:sldId id="854" r:id="rId13"/>
+    <p:sldId id="337" r:id="rId14"/>
+    <p:sldId id="338" r:id="rId15"/>
+    <p:sldId id="339" r:id="rId16"/>
+    <p:sldId id="341" r:id="rId17"/>
+    <p:sldId id="342" r:id="rId18"/>
+    <p:sldId id="343" r:id="rId19"/>
+    <p:sldId id="345" r:id="rId20"/>
+    <p:sldId id="344" r:id="rId21"/>
+    <p:sldId id="853" r:id="rId22"/>
+    <p:sldId id="331" r:id="rId23"/>
+    <p:sldId id="340" r:id="rId24"/>
+    <p:sldId id="322" r:id="rId25"/>
+    <p:sldId id="851" r:id="rId26"/>
+    <p:sldId id="852" r:id="rId27"/>
   </p:sldIdLst>
   <p:sldSz cx="12192000" cy="6858000"/>
   <p:notesSz cx="6858000" cy="9144000"/>
@@ -146,6 +152,7 @@
           <p14:sldIdLst>
             <p14:sldId id="332"/>
             <p14:sldId id="336"/>
+            <p14:sldId id="854"/>
             <p14:sldId id="337"/>
             <p14:sldId id="338"/>
           </p14:sldIdLst>
@@ -156,6 +163,9 @@
             <p14:sldId id="341"/>
             <p14:sldId id="342"/>
             <p14:sldId id="343"/>
+            <p14:sldId id="345"/>
+            <p14:sldId id="344"/>
+            <p14:sldId id="853"/>
           </p14:sldIdLst>
         </p14:section>
         <p14:section name="Untitled Section" id="{1AE6D1B1-034F-41C5-8AA9-246E86385608}">
@@ -163,6 +173,8 @@
             <p14:sldId id="331"/>
             <p14:sldId id="340"/>
             <p14:sldId id="322"/>
+            <p14:sldId id="851"/>
+            <p14:sldId id="852"/>
           </p14:sldIdLst>
         </p14:section>
       </p14:sectionLst>
@@ -256,7 +268,7 @@
           <a:p>
             <a:fld id="{7A71371E-0AB0-4E1B-9F79-83C8F32365BE}" type="datetimeFigureOut">
               <a:rPr lang="en-US" smtClean="0"/>
-              <a:t>11/2/2023</a:t>
+              <a:t>11/13/2023</a:t>
             </a:fld>
             <a:endParaRPr lang="en-US"/>
           </a:p>
@@ -1061,7 +1073,7 @@
           <a:p>
             <a:fld id="{CAA19DDD-B1BD-4DBB-A1A9-366082CC542B}" type="slidenum">
               <a:rPr lang="en-US" smtClean="0"/>
-              <a:t>12</a:t>
+              <a:t>13</a:t>
             </a:fld>
             <a:endParaRPr lang="en-US"/>
           </a:p>
@@ -1148,7 +1160,7 @@
           <a:p>
             <a:fld id="{CAA19DDD-B1BD-4DBB-A1A9-366082CC542B}" type="slidenum">
               <a:rPr lang="en-US" smtClean="0"/>
-              <a:t>15</a:t>
+              <a:t>16</a:t>
             </a:fld>
             <a:endParaRPr lang="en-US"/>
           </a:p>
@@ -1235,7 +1247,7 @@
           <a:p>
             <a:fld id="{CAA19DDD-B1BD-4DBB-A1A9-366082CC542B}" type="slidenum">
               <a:rPr lang="en-US" smtClean="0"/>
-              <a:t>16</a:t>
+              <a:t>17</a:t>
             </a:fld>
             <a:endParaRPr lang="en-US"/>
           </a:p>
@@ -1245,6 +1257,99 @@
     <p:extLst>
       <p:ext uri="{BB962C8B-B14F-4D97-AF65-F5344CB8AC3E}">
         <p14:creationId xmlns:p14="http://schemas.microsoft.com/office/powerpoint/2010/main" val="1933303265"/>
+      </p:ext>
+    </p:extLst>
+  </p:cSld>
+  <p:clrMapOvr>
+    <a:masterClrMapping/>
+  </p:clrMapOvr>
+</p:notes>
+</file>
+
+<file path=ppt/notesSlides/notesSlide9.xml><?xml version="1.0" encoding="utf-8"?>
+<p:notes xmlns:a="http://schemas.openxmlformats.org/drawingml/2006/main" xmlns:r="http://schemas.openxmlformats.org/officeDocument/2006/relationships" xmlns:p="http://schemas.openxmlformats.org/presentationml/2006/main">
+  <p:cSld>
+    <p:spTree>
+      <p:nvGrpSpPr>
+        <p:cNvPr id="1" name=""/>
+        <p:cNvGrpSpPr/>
+        <p:nvPr/>
+      </p:nvGrpSpPr>
+      <p:grpSpPr>
+        <a:xfrm>
+          <a:off x="0" y="0"/>
+          <a:ext cx="0" cy="0"/>
+          <a:chOff x="0" y="0"/>
+          <a:chExt cx="0" cy="0"/>
+        </a:xfrm>
+      </p:grpSpPr>
+      <p:sp>
+        <p:nvSpPr>
+          <p:cNvPr id="2" name="Slide Image Placeholder 1"/>
+          <p:cNvSpPr>
+            <a:spLocks noGrp="1" noRot="1" noChangeAspect="1"/>
+          </p:cNvSpPr>
+          <p:nvPr>
+            <p:ph type="sldImg"/>
+          </p:nvPr>
+        </p:nvSpPr>
+        <p:spPr/>
+      </p:sp>
+      <p:sp>
+        <p:nvSpPr>
+          <p:cNvPr id="3" name="Notes Placeholder 2"/>
+          <p:cNvSpPr>
+            <a:spLocks noGrp="1"/>
+          </p:cNvSpPr>
+          <p:nvPr>
+            <p:ph type="body" idx="1"/>
+          </p:nvPr>
+        </p:nvSpPr>
+        <p:spPr/>
+        <p:txBody>
+          <a:bodyPr/>
+          <a:lstStyle/>
+          <a:p>
+            <a:r>
+              <a:rPr lang="en-US" dirty="0"/>
+              <a:t>https://docs.xilinx.com/r/2021.1-English/ug1387-acap-hardware-ip-platform-dev-methodology/Synthesis-Attributes </a:t>
+            </a:r>
+          </a:p>
+          <a:p>
+            <a:r>
+              <a:rPr lang="en-US" dirty="0"/>
+              <a:t>https://docs.xilinx.com/r/en-US/ug901-vivado-synthesis/DONT_TOUCH</a:t>
+            </a:r>
+          </a:p>
+        </p:txBody>
+      </p:sp>
+      <p:sp>
+        <p:nvSpPr>
+          <p:cNvPr id="4" name="Slide Number Placeholder 3"/>
+          <p:cNvSpPr>
+            <a:spLocks noGrp="1"/>
+          </p:cNvSpPr>
+          <p:nvPr>
+            <p:ph type="sldNum" sz="quarter" idx="5"/>
+          </p:nvPr>
+        </p:nvSpPr>
+        <p:spPr/>
+        <p:txBody>
+          <a:bodyPr/>
+          <a:lstStyle/>
+          <a:p>
+            <a:fld id="{CAA19DDD-B1BD-4DBB-A1A9-366082CC542B}" type="slidenum">
+              <a:rPr lang="en-US" smtClean="0"/>
+              <a:t>21</a:t>
+            </a:fld>
+            <a:endParaRPr lang="en-US"/>
+          </a:p>
+        </p:txBody>
+      </p:sp>
+    </p:spTree>
+    <p:extLst>
+      <p:ext uri="{BB962C8B-B14F-4D97-AF65-F5344CB8AC3E}">
+        <p14:creationId xmlns:p14="http://schemas.microsoft.com/office/powerpoint/2010/main" val="1746533117"/>
       </p:ext>
     </p:extLst>
   </p:cSld>
@@ -1401,7 +1506,7 @@
           <a:p>
             <a:fld id="{8C8B827B-D727-48E9-881C-E759228D42E3}" type="datetimeFigureOut">
               <a:rPr lang="en-US" smtClean="0"/>
-              <a:t>11/2/2023</a:t>
+              <a:t>11/13/2023</a:t>
             </a:fld>
             <a:endParaRPr lang="en-US"/>
           </a:p>
@@ -1599,7 +1704,7 @@
           <a:p>
             <a:fld id="{8C8B827B-D727-48E9-881C-E759228D42E3}" type="datetimeFigureOut">
               <a:rPr lang="en-US" smtClean="0"/>
-              <a:t>11/2/2023</a:t>
+              <a:t>11/13/2023</a:t>
             </a:fld>
             <a:endParaRPr lang="en-US"/>
           </a:p>
@@ -1807,7 +1912,7 @@
           <a:p>
             <a:fld id="{8C8B827B-D727-48E9-881C-E759228D42E3}" type="datetimeFigureOut">
               <a:rPr lang="en-US" smtClean="0"/>
-              <a:t>11/2/2023</a:t>
+              <a:t>11/13/2023</a:t>
             </a:fld>
             <a:endParaRPr lang="en-US"/>
           </a:p>
@@ -1877,6 +1982,291 @@
   <p:clrMapOvr>
     <a:masterClrMapping/>
   </p:clrMapOvr>
+</p:sldLayout>
+</file>
+
+<file path=ppt/slideLayouts/slideLayout12.xml><?xml version="1.0" encoding="utf-8"?>
+<p:sldLayout xmlns:a="http://schemas.openxmlformats.org/drawingml/2006/main" xmlns:r="http://schemas.openxmlformats.org/officeDocument/2006/relationships" xmlns:p="http://schemas.openxmlformats.org/presentationml/2006/main" showMasterSp="0" type="tx">
+  <p:cSld name="Custom Layout">
+    <p:spTree>
+      <p:nvGrpSpPr>
+        <p:cNvPr id="1" name=""/>
+        <p:cNvGrpSpPr/>
+        <p:nvPr/>
+      </p:nvGrpSpPr>
+      <p:grpSpPr>
+        <a:xfrm>
+          <a:off x="0" y="0"/>
+          <a:ext cx="0" cy="0"/>
+          <a:chOff x="0" y="0"/>
+          <a:chExt cx="0" cy="0"/>
+        </a:xfrm>
+      </p:grpSpPr>
+      <p:sp>
+        <p:nvSpPr>
+          <p:cNvPr id="19" name="Straight Connector 6"/>
+          <p:cNvSpPr/>
+          <p:nvPr/>
+        </p:nvSpPr>
+        <p:spPr>
+          <a:xfrm>
+            <a:off x="1" y="6421438"/>
+            <a:ext cx="12192001" cy="1"/>
+          </a:xfrm>
+          <a:prstGeom prst="line">
+            <a:avLst/>
+          </a:prstGeom>
+          <a:ln>
+            <a:solidFill>
+              <a:srgbClr val="FFCB05"/>
+            </a:solidFill>
+          </a:ln>
+        </p:spPr>
+        <p:txBody>
+          <a:bodyPr lIns="60959" rIns="60959"/>
+          <a:lstStyle/>
+          <a:p>
+            <a:endParaRPr sz="2400"/>
+          </a:p>
+        </p:txBody>
+      </p:sp>
+      <p:sp>
+        <p:nvSpPr>
+          <p:cNvPr id="20" name="Straight Connector 9"/>
+          <p:cNvSpPr/>
+          <p:nvPr/>
+        </p:nvSpPr>
+        <p:spPr>
+          <a:xfrm>
+            <a:off x="1" y="679450"/>
+            <a:ext cx="12192001" cy="1"/>
+          </a:xfrm>
+          <a:prstGeom prst="line">
+            <a:avLst/>
+          </a:prstGeom>
+          <a:ln>
+            <a:solidFill>
+              <a:srgbClr val="FFCB05"/>
+            </a:solidFill>
+          </a:ln>
+        </p:spPr>
+        <p:txBody>
+          <a:bodyPr lIns="60959" rIns="60959"/>
+          <a:lstStyle/>
+          <a:p>
+            <a:endParaRPr sz="2400"/>
+          </a:p>
+        </p:txBody>
+      </p:sp>
+      <p:sp>
+        <p:nvSpPr>
+          <p:cNvPr id="21" name="标题文本"/>
+          <p:cNvSpPr txBox="1">
+            <a:spLocks noGrp="1"/>
+          </p:cNvSpPr>
+          <p:nvPr>
+            <p:ph type="title"/>
+          </p:nvPr>
+        </p:nvSpPr>
+        <p:spPr>
+          <a:xfrm>
+            <a:off x="268819" y="50800"/>
+            <a:ext cx="11837339" cy="577851"/>
+          </a:xfrm>
+          <a:prstGeom prst="rect">
+            <a:avLst/>
+          </a:prstGeom>
+        </p:spPr>
+        <p:txBody>
+          <a:bodyPr>
+            <a:normAutofit/>
+          </a:bodyPr>
+          <a:lstStyle>
+            <a:lvl1pPr algn="l">
+              <a:defRPr sz="3600" b="1">
+                <a:solidFill>
+                  <a:srgbClr val="00274C"/>
+                </a:solidFill>
+                <a:latin typeface="Arial"/>
+                <a:ea typeface="Arial"/>
+                <a:cs typeface="Arial"/>
+                <a:sym typeface="Arial"/>
+              </a:defRPr>
+            </a:lvl1pPr>
+          </a:lstStyle>
+          <a:p>
+            <a:r>
+              <a:t>标题文本</a:t>
+            </a:r>
+          </a:p>
+        </p:txBody>
+      </p:sp>
+      <p:sp>
+        <p:nvSpPr>
+          <p:cNvPr id="22" name="幻灯片编号"/>
+          <p:cNvSpPr txBox="1">
+            <a:spLocks noGrp="1"/>
+          </p:cNvSpPr>
+          <p:nvPr>
+            <p:ph type="sldNum" sz="quarter" idx="2"/>
+          </p:nvPr>
+        </p:nvSpPr>
+        <p:spPr>
+          <a:xfrm>
+            <a:off x="11700900" y="6415183"/>
+            <a:ext cx="405256" cy="409788"/>
+          </a:xfrm>
+          <a:prstGeom prst="rect">
+            <a:avLst/>
+          </a:prstGeom>
+        </p:spPr>
+        <p:txBody>
+          <a:bodyPr/>
+          <a:lstStyle>
+            <a:lvl1pPr>
+              <a:defRPr sz="2000">
+                <a:solidFill>
+                  <a:srgbClr val="888888"/>
+                </a:solidFill>
+              </a:defRPr>
+            </a:lvl1pPr>
+          </a:lstStyle>
+          <a:p>
+            <a:fld id="{86CB4B4D-7CA3-9044-876B-883B54F8677D}" type="slidenum">
+              <a:t>‹#›</a:t>
+            </a:fld>
+            <a:endParaRPr/>
+          </a:p>
+        </p:txBody>
+      </p:sp>
+      <p:sp>
+        <p:nvSpPr>
+          <p:cNvPr id="23" name="正文级别 1…"/>
+          <p:cNvSpPr txBox="1">
+            <a:spLocks noGrp="1"/>
+          </p:cNvSpPr>
+          <p:nvPr>
+            <p:ph type="body" idx="1"/>
+          </p:nvPr>
+        </p:nvSpPr>
+        <p:spPr>
+          <a:xfrm>
+            <a:off x="268289" y="787401"/>
+            <a:ext cx="11837987" cy="5543551"/>
+          </a:xfrm>
+          <a:prstGeom prst="rect">
+            <a:avLst/>
+          </a:prstGeom>
+        </p:spPr>
+        <p:txBody>
+          <a:bodyPr>
+            <a:normAutofit/>
+          </a:bodyPr>
+          <a:lstStyle>
+            <a:lvl1pPr>
+              <a:buFontTx/>
+              <a:buChar char="▪"/>
+              <a:defRPr sz="2800">
+                <a:solidFill>
+                  <a:srgbClr val="00274C"/>
+                </a:solidFill>
+                <a:latin typeface="Arial"/>
+                <a:ea typeface="Arial"/>
+                <a:cs typeface="Arial"/>
+                <a:sym typeface="Arial"/>
+              </a:defRPr>
+            </a:lvl1pPr>
+            <a:lvl2pPr marL="741344" indent="-284154">
+              <a:buFontTx/>
+              <a:defRPr sz="2800">
+                <a:solidFill>
+                  <a:srgbClr val="00274C"/>
+                </a:solidFill>
+                <a:latin typeface="Arial"/>
+                <a:ea typeface="Arial"/>
+                <a:cs typeface="Arial"/>
+                <a:sym typeface="Arial"/>
+              </a:defRPr>
+            </a:lvl2pPr>
+            <a:lvl3pPr marL="1179219" indent="-264841">
+              <a:buFontTx/>
+              <a:defRPr sz="2800">
+                <a:solidFill>
+                  <a:srgbClr val="00274C"/>
+                </a:solidFill>
+                <a:latin typeface="Arial"/>
+                <a:ea typeface="Arial"/>
+                <a:cs typeface="Arial"/>
+                <a:sym typeface="Arial"/>
+              </a:defRPr>
+            </a:lvl3pPr>
+            <a:lvl4pPr marL="1689375" indent="-317809">
+              <a:buFontTx/>
+              <a:defRPr sz="2800">
+                <a:solidFill>
+                  <a:srgbClr val="00274C"/>
+                </a:solidFill>
+                <a:latin typeface="Arial"/>
+                <a:ea typeface="Arial"/>
+                <a:cs typeface="Arial"/>
+                <a:sym typeface="Arial"/>
+              </a:defRPr>
+            </a:lvl4pPr>
+            <a:lvl5pPr marL="2146564" indent="-317809">
+              <a:buFontTx/>
+              <a:defRPr sz="2800">
+                <a:solidFill>
+                  <a:srgbClr val="00274C"/>
+                </a:solidFill>
+                <a:latin typeface="Arial"/>
+                <a:ea typeface="Arial"/>
+                <a:cs typeface="Arial"/>
+                <a:sym typeface="Arial"/>
+              </a:defRPr>
+            </a:lvl5pPr>
+          </a:lstStyle>
+          <a:p>
+            <a:r>
+              <a:t>正文级别 1</a:t>
+            </a:r>
+          </a:p>
+          <a:p>
+            <a:pPr lvl="1"/>
+            <a:r>
+              <a:t>正文级别 2</a:t>
+            </a:r>
+          </a:p>
+          <a:p>
+            <a:pPr lvl="2"/>
+            <a:r>
+              <a:t>正文级别 3</a:t>
+            </a:r>
+          </a:p>
+          <a:p>
+            <a:pPr lvl="3"/>
+            <a:r>
+              <a:t>正文级别 4</a:t>
+            </a:r>
+          </a:p>
+          <a:p>
+            <a:pPr lvl="4"/>
+            <a:r>
+              <a:t>正文级别 5</a:t>
+            </a:r>
+          </a:p>
+        </p:txBody>
+      </p:sp>
+    </p:spTree>
+    <p:extLst>
+      <p:ext uri="{BB962C8B-B14F-4D97-AF65-F5344CB8AC3E}">
+        <p14:creationId xmlns:p14="http://schemas.microsoft.com/office/powerpoint/2010/main" val="2410956685"/>
+      </p:ext>
+    </p:extLst>
+  </p:cSld>
+  <p:clrMapOvr>
+    <a:masterClrMapping/>
+  </p:clrMapOvr>
+  <p:transition spd="med"/>
 </p:sldLayout>
 </file>
 
@@ -2005,7 +2395,7 @@
           <a:p>
             <a:fld id="{8C8B827B-D727-48E9-881C-E759228D42E3}" type="datetimeFigureOut">
               <a:rPr lang="en-US" smtClean="0"/>
-              <a:t>11/2/2023</a:t>
+              <a:t>11/13/2023</a:t>
             </a:fld>
             <a:endParaRPr lang="en-US"/>
           </a:p>
@@ -2280,7 +2670,7 @@
           <a:p>
             <a:fld id="{8C8B827B-D727-48E9-881C-E759228D42E3}" type="datetimeFigureOut">
               <a:rPr lang="en-US" smtClean="0"/>
-              <a:t>11/2/2023</a:t>
+              <a:t>11/13/2023</a:t>
             </a:fld>
             <a:endParaRPr lang="en-US"/>
           </a:p>
@@ -2545,7 +2935,7 @@
           <a:p>
             <a:fld id="{8C8B827B-D727-48E9-881C-E759228D42E3}" type="datetimeFigureOut">
               <a:rPr lang="en-US" smtClean="0"/>
-              <a:t>11/2/2023</a:t>
+              <a:t>11/13/2023</a:t>
             </a:fld>
             <a:endParaRPr lang="en-US"/>
           </a:p>
@@ -2957,7 +3347,7 @@
           <a:p>
             <a:fld id="{8C8B827B-D727-48E9-881C-E759228D42E3}" type="datetimeFigureOut">
               <a:rPr lang="en-US" smtClean="0"/>
-              <a:t>11/2/2023</a:t>
+              <a:t>11/13/2023</a:t>
             </a:fld>
             <a:endParaRPr lang="en-US"/>
           </a:p>
@@ -3098,7 +3488,7 @@
           <a:p>
             <a:fld id="{8C8B827B-D727-48E9-881C-E759228D42E3}" type="datetimeFigureOut">
               <a:rPr lang="en-US" smtClean="0"/>
-              <a:t>11/2/2023</a:t>
+              <a:t>11/13/2023</a:t>
             </a:fld>
             <a:endParaRPr lang="en-US"/>
           </a:p>
@@ -3211,7 +3601,7 @@
           <a:p>
             <a:fld id="{8C8B827B-D727-48E9-881C-E759228D42E3}" type="datetimeFigureOut">
               <a:rPr lang="en-US" smtClean="0"/>
-              <a:t>11/2/2023</a:t>
+              <a:t>11/13/2023</a:t>
             </a:fld>
             <a:endParaRPr lang="en-US"/>
           </a:p>
@@ -3522,7 +3912,7 @@
           <a:p>
             <a:fld id="{8C8B827B-D727-48E9-881C-E759228D42E3}" type="datetimeFigureOut">
               <a:rPr lang="en-US" smtClean="0"/>
-              <a:t>11/2/2023</a:t>
+              <a:t>11/13/2023</a:t>
             </a:fld>
             <a:endParaRPr lang="en-US"/>
           </a:p>
@@ -3810,7 +4200,7 @@
           <a:p>
             <a:fld id="{8C8B827B-D727-48E9-881C-E759228D42E3}" type="datetimeFigureOut">
               <a:rPr lang="en-US" smtClean="0"/>
-              <a:t>11/2/2023</a:t>
+              <a:t>11/13/2023</a:t>
             </a:fld>
             <a:endParaRPr lang="en-US"/>
           </a:p>
@@ -4051,7 +4441,7 @@
           <a:p>
             <a:fld id="{8C8B827B-D727-48E9-881C-E759228D42E3}" type="datetimeFigureOut">
               <a:rPr lang="en-US" smtClean="0"/>
-              <a:t>11/2/2023</a:t>
+              <a:t>11/13/2023</a:t>
             </a:fld>
             <a:endParaRPr lang="en-US"/>
           </a:p>
@@ -4167,6 +4557,7 @@
     <p:sldLayoutId id="2147483657" r:id="rId9"/>
     <p:sldLayoutId id="2147483658" r:id="rId10"/>
     <p:sldLayoutId id="2147483659" r:id="rId11"/>
+    <p:sldLayoutId id="2147483660" r:id="rId12"/>
   </p:sldLayoutIdLst>
   <p:txStyles>
     <p:titleStyle>
@@ -4905,6 +5296,119 @@
           <p:cNvPr id="2" name="Title 1">
             <a:extLst>
               <a:ext uri="{FF2B5EF4-FFF2-40B4-BE49-F238E27FC236}">
+                <a16:creationId xmlns:a16="http://schemas.microsoft.com/office/drawing/2014/main" id="{4AA73023-70BF-B021-5D79-F28D981113FF}"/>
+              </a:ext>
+            </a:extLst>
+          </p:cNvPr>
+          <p:cNvSpPr>
+            <a:spLocks noGrp="1"/>
+          </p:cNvSpPr>
+          <p:nvPr>
+            <p:ph type="title"/>
+          </p:nvPr>
+        </p:nvSpPr>
+        <p:spPr/>
+        <p:txBody>
+          <a:bodyPr/>
+          <a:lstStyle/>
+          <a:p>
+            <a:r>
+              <a:rPr lang="en-US" dirty="0"/>
+              <a:t>Some Verilog advice</a:t>
+            </a:r>
+          </a:p>
+        </p:txBody>
+      </p:sp>
+      <p:sp>
+        <p:nvSpPr>
+          <p:cNvPr id="3" name="Content Placeholder 2">
+            <a:extLst>
+              <a:ext uri="{FF2B5EF4-FFF2-40B4-BE49-F238E27FC236}">
+                <a16:creationId xmlns:a16="http://schemas.microsoft.com/office/drawing/2014/main" id="{F2BAF08F-B4D0-9064-519F-1062F65ECC03}"/>
+              </a:ext>
+            </a:extLst>
+          </p:cNvPr>
+          <p:cNvSpPr>
+            <a:spLocks noGrp="1"/>
+          </p:cNvSpPr>
+          <p:nvPr>
+            <p:ph idx="1"/>
+          </p:nvPr>
+        </p:nvSpPr>
+        <p:spPr/>
+        <p:txBody>
+          <a:bodyPr/>
+          <a:lstStyle/>
+          <a:p>
+            <a:r>
+              <a:rPr lang="en-US" dirty="0">
+                <a:hlinkClick r:id="rId2"/>
+              </a:rPr>
+              <a:t>https://nandland.com/coding-style-guidelines-for-vhdl-verilog/</a:t>
+            </a:r>
+            <a:endParaRPr lang="en-US" dirty="0"/>
+          </a:p>
+          <a:p>
+            <a:r>
+              <a:rPr lang="en-US" dirty="0">
+                <a:hlinkClick r:id="rId3"/>
+              </a:rPr>
+              <a:t>https://projectf.io/posts/multiplication-fpga-dsps/</a:t>
+            </a:r>
+            <a:r>
+              <a:rPr lang="en-US" dirty="0"/>
+              <a:t> </a:t>
+            </a:r>
+          </a:p>
+          <a:p>
+            <a:r>
+              <a:rPr lang="en-US" dirty="0">
+                <a:hlinkClick r:id="rId4"/>
+              </a:rPr>
+              <a:t>https://docs.xilinx.com/r/en-US/ug901-vivado-synthesis/Multipliers-Coding-Examples</a:t>
+            </a:r>
+            <a:r>
+              <a:rPr lang="en-US" dirty="0"/>
+              <a:t> </a:t>
+            </a:r>
+          </a:p>
+        </p:txBody>
+      </p:sp>
+    </p:spTree>
+    <p:extLst>
+      <p:ext uri="{BB962C8B-B14F-4D97-AF65-F5344CB8AC3E}">
+        <p14:creationId xmlns:p14="http://schemas.microsoft.com/office/powerpoint/2010/main" val="3107489603"/>
+      </p:ext>
+    </p:extLst>
+  </p:cSld>
+  <p:clrMapOvr>
+    <a:masterClrMapping/>
+  </p:clrMapOvr>
+</p:sld>
+</file>
+
+<file path=ppt/slides/slide13.xml><?xml version="1.0" encoding="utf-8"?>
+<p:sld xmlns:a="http://schemas.openxmlformats.org/drawingml/2006/main" xmlns:r="http://schemas.openxmlformats.org/officeDocument/2006/relationships" xmlns:p="http://schemas.openxmlformats.org/presentationml/2006/main">
+  <p:cSld>
+    <p:spTree>
+      <p:nvGrpSpPr>
+        <p:cNvPr id="1" name=""/>
+        <p:cNvGrpSpPr/>
+        <p:nvPr/>
+      </p:nvGrpSpPr>
+      <p:grpSpPr>
+        <a:xfrm>
+          <a:off x="0" y="0"/>
+          <a:ext cx="0" cy="0"/>
+          <a:chOff x="0" y="0"/>
+          <a:chExt cx="0" cy="0"/>
+        </a:xfrm>
+      </p:grpSpPr>
+      <p:sp>
+        <p:nvSpPr>
+          <p:cNvPr id="2" name="Title 1">
+            <a:extLst>
+              <a:ext uri="{FF2B5EF4-FFF2-40B4-BE49-F238E27FC236}">
                 <a16:creationId xmlns:a16="http://schemas.microsoft.com/office/drawing/2014/main" id="{95C57F3C-E4E3-AB2D-7190-335EDA523F9D}"/>
               </a:ext>
             </a:extLst>
@@ -5048,7 +5552,7 @@
 </p:sld>
 </file>
 
-<file path=ppt/slides/slide13.xml><?xml version="1.0" encoding="utf-8"?>
+<file path=ppt/slides/slide14.xml><?xml version="1.0" encoding="utf-8"?>
 <p:sld xmlns:a="http://schemas.openxmlformats.org/drawingml/2006/main" xmlns:r="http://schemas.openxmlformats.org/officeDocument/2006/relationships" xmlns:p="http://schemas.openxmlformats.org/presentationml/2006/main">
   <p:cSld>
     <p:spTree>
@@ -5222,7 +5726,7 @@
 </p:sld>
 </file>
 
-<file path=ppt/slides/slide14.xml><?xml version="1.0" encoding="utf-8"?>
+<file path=ppt/slides/slide15.xml><?xml version="1.0" encoding="utf-8"?>
 <p:sld xmlns:a="http://schemas.openxmlformats.org/drawingml/2006/main" xmlns:r="http://schemas.openxmlformats.org/officeDocument/2006/relationships" xmlns:p="http://schemas.openxmlformats.org/presentationml/2006/main">
   <p:cSld>
     <p:spTree>
@@ -5456,7 +5960,7 @@
 </p:sld>
 </file>
 
-<file path=ppt/slides/slide15.xml><?xml version="1.0" encoding="utf-8"?>
+<file path=ppt/slides/slide16.xml><?xml version="1.0" encoding="utf-8"?>
 <p:sld xmlns:a="http://schemas.openxmlformats.org/drawingml/2006/main" xmlns:r="http://schemas.openxmlformats.org/officeDocument/2006/relationships" xmlns:p="http://schemas.openxmlformats.org/presentationml/2006/main">
   <p:cSld>
     <p:spTree>
@@ -5622,8 +6126,8 @@
         </p:blipFill>
         <p:spPr bwMode="auto">
           <a:xfrm>
-            <a:off x="7845552" y="365125"/>
-            <a:ext cx="4130040" cy="2483760"/>
+            <a:off x="9298490" y="365125"/>
+            <a:ext cx="2677102" cy="1609979"/>
           </a:xfrm>
           <a:prstGeom prst="rect">
             <a:avLst/>
@@ -5653,127 +6157,6 @@
 </p:sld>
 </file>
 
-<file path=ppt/slides/slide16.xml><?xml version="1.0" encoding="utf-8"?>
-<p:sld xmlns:a="http://schemas.openxmlformats.org/drawingml/2006/main" xmlns:r="http://schemas.openxmlformats.org/officeDocument/2006/relationships" xmlns:p="http://schemas.openxmlformats.org/presentationml/2006/main">
-  <p:cSld>
-    <p:spTree>
-      <p:nvGrpSpPr>
-        <p:cNvPr id="1" name=""/>
-        <p:cNvGrpSpPr/>
-        <p:nvPr/>
-      </p:nvGrpSpPr>
-      <p:grpSpPr>
-        <a:xfrm>
-          <a:off x="0" y="0"/>
-          <a:ext cx="0" cy="0"/>
-          <a:chOff x="0" y="0"/>
-          <a:chExt cx="0" cy="0"/>
-        </a:xfrm>
-      </p:grpSpPr>
-      <p:sp>
-        <p:nvSpPr>
-          <p:cNvPr id="2" name="Title 1">
-            <a:extLst>
-              <a:ext uri="{FF2B5EF4-FFF2-40B4-BE49-F238E27FC236}">
-                <a16:creationId xmlns:a16="http://schemas.microsoft.com/office/drawing/2014/main" id="{B0617B3C-340A-92F7-5652-58CF78DE8C87}"/>
-              </a:ext>
-            </a:extLst>
-          </p:cNvPr>
-          <p:cNvSpPr>
-            <a:spLocks noGrp="1"/>
-          </p:cNvSpPr>
-          <p:nvPr>
-            <p:ph type="title"/>
-          </p:nvPr>
-        </p:nvSpPr>
-        <p:spPr/>
-        <p:txBody>
-          <a:bodyPr/>
-          <a:lstStyle/>
-          <a:p>
-            <a:r>
-              <a:rPr lang="en-US" dirty="0"/>
-              <a:t>Cherry-picking</a:t>
-            </a:r>
-          </a:p>
-        </p:txBody>
-      </p:sp>
-      <p:sp>
-        <p:nvSpPr>
-          <p:cNvPr id="3" name="Content Placeholder 2">
-            <a:extLst>
-              <a:ext uri="{FF2B5EF4-FFF2-40B4-BE49-F238E27FC236}">
-                <a16:creationId xmlns:a16="http://schemas.microsoft.com/office/drawing/2014/main" id="{802607F8-C357-48D0-A769-A1B76C353C29}"/>
-              </a:ext>
-            </a:extLst>
-          </p:cNvPr>
-          <p:cNvSpPr>
-            <a:spLocks noGrp="1"/>
-          </p:cNvSpPr>
-          <p:nvPr>
-            <p:ph idx="1"/>
-          </p:nvPr>
-        </p:nvSpPr>
-        <p:spPr/>
-        <p:txBody>
-          <a:bodyPr/>
-          <a:lstStyle/>
-          <a:p>
-            <a:r>
-              <a:rPr lang="en-US" dirty="0"/>
-              <a:t>What if we developed on a stable release branch?</a:t>
-            </a:r>
-          </a:p>
-          <a:p>
-            <a:pPr lvl="1"/>
-            <a:r>
-              <a:rPr lang="en-US" dirty="0"/>
-              <a:t>We want to selectively apply all of our changes from our current branch to the upstream/master branch</a:t>
-            </a:r>
-          </a:p>
-          <a:p>
-            <a:pPr lvl="1"/>
-            <a:r>
-              <a:rPr lang="en-US" dirty="0"/>
-              <a:t>go to your history and find the range of all commits you want</a:t>
-            </a:r>
-          </a:p>
-          <a:p>
-            <a:pPr lvl="1"/>
-            <a:r>
-              <a:rPr lang="en-US" dirty="0"/>
-              <a:t>git cherry-pick &lt;oldest commit&gt;^..&lt;latest commit&gt;</a:t>
-            </a:r>
-          </a:p>
-          <a:p>
-            <a:r>
-              <a:rPr lang="en-US" dirty="0"/>
-              <a:t>This is a one-off trick! Not a permanent solution! Do this to transition to the </a:t>
-            </a:r>
-            <a:r>
-              <a:rPr lang="en-US" dirty="0" err="1"/>
-              <a:t>uhd</a:t>
-            </a:r>
-            <a:r>
-              <a:rPr lang="en-US" dirty="0"/>
-              <a:t> master branch.</a:t>
-            </a:r>
-          </a:p>
-        </p:txBody>
-      </p:sp>
-    </p:spTree>
-    <p:extLst>
-      <p:ext uri="{BB962C8B-B14F-4D97-AF65-F5344CB8AC3E}">
-        <p14:creationId xmlns:p14="http://schemas.microsoft.com/office/powerpoint/2010/main" val="300669522"/>
-      </p:ext>
-    </p:extLst>
-  </p:cSld>
-  <p:clrMapOvr>
-    <a:masterClrMapping/>
-  </p:clrMapOvr>
-</p:sld>
-</file>
-
 <file path=ppt/slides/slide17.xml><?xml version="1.0" encoding="utf-8"?>
 <p:sld xmlns:a="http://schemas.openxmlformats.org/drawingml/2006/main" xmlns:r="http://schemas.openxmlformats.org/officeDocument/2006/relationships" xmlns:p="http://schemas.openxmlformats.org/presentationml/2006/main">
   <p:cSld>
@@ -5796,7 +6179,7 @@
           <p:cNvPr id="2" name="Title 1">
             <a:extLst>
               <a:ext uri="{FF2B5EF4-FFF2-40B4-BE49-F238E27FC236}">
-                <a16:creationId xmlns:a16="http://schemas.microsoft.com/office/drawing/2014/main" id="{542AED8C-0993-2A2B-B48E-7B447E91D048}"/>
+                <a16:creationId xmlns:a16="http://schemas.microsoft.com/office/drawing/2014/main" id="{B0617B3C-340A-92F7-5652-58CF78DE8C87}"/>
               </a:ext>
             </a:extLst>
           </p:cNvPr>
@@ -5814,7 +6197,7 @@
           <a:p>
             <a:r>
               <a:rPr lang="en-US" dirty="0"/>
-              <a:t>to do:</a:t>
+              <a:t>Cherry-picking</a:t>
             </a:r>
           </a:p>
         </p:txBody>
@@ -5824,7 +6207,7 @@
           <p:cNvPr id="3" name="Content Placeholder 2">
             <a:extLst>
               <a:ext uri="{FF2B5EF4-FFF2-40B4-BE49-F238E27FC236}">
-                <a16:creationId xmlns:a16="http://schemas.microsoft.com/office/drawing/2014/main" id="{847C2603-B19D-2774-37E9-06D50F0DC7CF}"/>
+                <a16:creationId xmlns:a16="http://schemas.microsoft.com/office/drawing/2014/main" id="{802607F8-C357-48D0-A769-A1B76C353C29}"/>
               </a:ext>
             </a:extLst>
           </p:cNvPr>
@@ -5841,12 +6224,43 @@
           <a:lstStyle/>
           <a:p>
             <a:r>
+              <a:rPr lang="en-US" dirty="0"/>
+              <a:t>What if we developed on a stable release branch?</a:t>
+            </a:r>
+          </a:p>
+          <a:p>
+            <a:pPr lvl="1"/>
+            <a:r>
+              <a:rPr lang="en-US" dirty="0"/>
+              <a:t>We want to selectively apply all of our changes from our current branch to the upstream/master branch</a:t>
+            </a:r>
+          </a:p>
+          <a:p>
+            <a:pPr lvl="1"/>
+            <a:r>
+              <a:rPr lang="en-US" dirty="0"/>
+              <a:t>go to your history and find the range of all commits you want</a:t>
+            </a:r>
+          </a:p>
+          <a:p>
+            <a:pPr lvl="1"/>
+            <a:r>
+              <a:rPr lang="en-US" dirty="0"/>
+              <a:t>git cherry-pick &lt;oldest commit&gt;^..&lt;latest commit&gt;</a:t>
+            </a:r>
+          </a:p>
+          <a:p>
+            <a:r>
+              <a:rPr lang="en-US" dirty="0"/>
+              <a:t>This is a one-off trick! Not a permanent solution! Do this to transition to the </a:t>
+            </a:r>
+            <a:r>
               <a:rPr lang="en-US" dirty="0" err="1"/>
-              <a:t>cpp</a:t>
-            </a:r>
-            <a:r>
-              <a:rPr lang="en-US"/>
-              <a:t> file setup</a:t>
+              <a:t>uhd</a:t>
+            </a:r>
+            <a:r>
+              <a:rPr lang="en-US" dirty="0"/>
+              <a:t> master branch.</a:t>
             </a:r>
           </a:p>
         </p:txBody>
@@ -5854,7 +6268,7 @@
     </p:spTree>
     <p:extLst>
       <p:ext uri="{BB962C8B-B14F-4D97-AF65-F5344CB8AC3E}">
-        <p14:creationId xmlns:p14="http://schemas.microsoft.com/office/powerpoint/2010/main" val="641796369"/>
+        <p14:creationId xmlns:p14="http://schemas.microsoft.com/office/powerpoint/2010/main" val="300669522"/>
       </p:ext>
     </p:extLst>
   </p:cSld>
@@ -5886,7 +6300,7 @@
           <p:cNvPr id="2" name="Title 1">
             <a:extLst>
               <a:ext uri="{FF2B5EF4-FFF2-40B4-BE49-F238E27FC236}">
-                <a16:creationId xmlns:a16="http://schemas.microsoft.com/office/drawing/2014/main" id="{9D06B023-DC6A-41F3-4AE9-E867DC09A16F}"/>
+                <a16:creationId xmlns:a16="http://schemas.microsoft.com/office/drawing/2014/main" id="{542AED8C-0993-2A2B-B48E-7B447E91D048}"/>
               </a:ext>
             </a:extLst>
           </p:cNvPr>
@@ -5904,7 +6318,7 @@
           <a:p>
             <a:r>
               <a:rPr lang="en-US" dirty="0"/>
-              <a:t>Repo overview</a:t>
+              <a:t>to do:</a:t>
             </a:r>
           </a:p>
         </p:txBody>
@@ -5914,7 +6328,7 @@
           <p:cNvPr id="3" name="Content Placeholder 2">
             <a:extLst>
               <a:ext uri="{FF2B5EF4-FFF2-40B4-BE49-F238E27FC236}">
-                <a16:creationId xmlns:a16="http://schemas.microsoft.com/office/drawing/2014/main" id="{F12D3D4B-9539-38B4-187E-83D8AAB01749}"/>
+                <a16:creationId xmlns:a16="http://schemas.microsoft.com/office/drawing/2014/main" id="{847C2603-B19D-2774-37E9-06D50F0DC7CF}"/>
               </a:ext>
             </a:extLst>
           </p:cNvPr>
@@ -5927,87 +6341,78 @@
         </p:nvSpPr>
         <p:spPr/>
         <p:txBody>
-          <a:bodyPr>
-            <a:normAutofit/>
+          <a:bodyPr/>
+          <a:lstStyle/>
+          <a:p>
+            <a:r>
+              <a:rPr lang="en-US" dirty="0" err="1"/>
+              <a:t>cpp</a:t>
+            </a:r>
+            <a:r>
+              <a:rPr lang="en-US" dirty="0"/>
+              <a:t> file setup</a:t>
+            </a:r>
+          </a:p>
+          <a:p>
+            <a:r>
+              <a:rPr lang="en-US" dirty="0"/>
+              <a:t>/host/examples/txrx_loopback_to_file.cpp</a:t>
+            </a:r>
+          </a:p>
+          <a:p>
+            <a:r>
+              <a:rPr lang="en-US" dirty="0"/>
+              <a:t>simulation </a:t>
+            </a:r>
+            <a:r>
+              <a:rPr lang="en-US" dirty="0" err="1"/>
+              <a:t>makefile</a:t>
+            </a:r>
+            <a:r>
+              <a:rPr lang="en-US" dirty="0"/>
+              <a:t> </a:t>
+            </a:r>
+          </a:p>
+          <a:p>
+            <a:pPr lvl="1"/>
+            <a:r>
+              <a:rPr lang="en-US" dirty="0"/>
+              <a:t>https://files.ettus.com/manual/md_usrp3_sim_writing_sim_makefile.html</a:t>
+            </a:r>
+          </a:p>
+        </p:txBody>
+      </p:sp>
+      <p:sp>
+        <p:nvSpPr>
+          <p:cNvPr id="5" name="TextBox 4">
+            <a:extLst>
+              <a:ext uri="{FF2B5EF4-FFF2-40B4-BE49-F238E27FC236}">
+                <a16:creationId xmlns:a16="http://schemas.microsoft.com/office/drawing/2014/main" id="{0FCD2A3E-E74D-9A33-B125-E53F7085DE49}"/>
+              </a:ext>
+            </a:extLst>
+          </p:cNvPr>
+          <p:cNvSpPr txBox="1"/>
+          <p:nvPr/>
+        </p:nvSpPr>
+        <p:spPr>
+          <a:xfrm>
+            <a:off x="989838" y="4815763"/>
+            <a:ext cx="6094476" cy="646331"/>
+          </a:xfrm>
+          <a:prstGeom prst="rect">
+            <a:avLst/>
+          </a:prstGeom>
+          <a:noFill/>
+        </p:spPr>
+        <p:txBody>
+          <a:bodyPr wrap="square">
+            <a:spAutoFit/>
           </a:bodyPr>
           <a:lstStyle/>
           <a:p>
             <a:r>
-              <a:rPr lang="en-US" dirty="0" err="1"/>
-              <a:t>uhd</a:t>
-            </a:r>
-            <a:r>
-              <a:rPr lang="en-US" dirty="0"/>
-              <a:t>/</a:t>
-            </a:r>
-            <a:r>
-              <a:rPr lang="en-US" dirty="0" err="1"/>
-              <a:t>fpga</a:t>
-            </a:r>
-            <a:r>
-              <a:rPr lang="en-US" dirty="0"/>
-              <a:t> contains the Verilog used on the USRPs</a:t>
-            </a:r>
-          </a:p>
-          <a:p>
-            <a:pPr marL="457200" lvl="1" indent="0">
-              <a:buNone/>
-            </a:pPr>
-            <a:r>
-              <a:rPr lang="en-US" dirty="0">
-                <a:hlinkClick r:id="rId2"/>
-              </a:rPr>
-              <a:t>https://github.com/EttusResearch/uhd/tree/master/fpga/usrp3/top/x300</a:t>
-            </a:r>
-            <a:endParaRPr lang="en-US" dirty="0"/>
-          </a:p>
-          <a:p>
-            <a:r>
-              <a:rPr lang="en-US" dirty="0"/>
-              <a:t>All the action happens in x300_core</a:t>
-            </a:r>
-          </a:p>
-          <a:p>
-            <a:pPr lvl="1"/>
-            <a:r>
-              <a:rPr lang="en-US" dirty="0"/>
-              <a:t>handles communication with PC, </a:t>
-            </a:r>
-            <a:r>
-              <a:rPr lang="en-US" dirty="0" err="1"/>
-              <a:t>gpio</a:t>
-            </a:r>
-            <a:r>
-              <a:rPr lang="en-US" dirty="0"/>
-              <a:t>, </a:t>
-            </a:r>
-            <a:r>
-              <a:rPr lang="en-US" dirty="0" err="1"/>
-              <a:t>adc</a:t>
-            </a:r>
-            <a:r>
-              <a:rPr lang="en-US" dirty="0"/>
-              <a:t>/</a:t>
-            </a:r>
-            <a:r>
-              <a:rPr lang="en-US" dirty="0" err="1"/>
-              <a:t>dac</a:t>
-            </a:r>
-            <a:r>
-              <a:rPr lang="en-US" dirty="0"/>
-              <a:t>, nonideality correction</a:t>
-            </a:r>
-          </a:p>
-          <a:p>
-            <a:r>
-              <a:rPr lang="en-US" dirty="0"/>
-              <a:t>We will insert our module here</a:t>
-            </a:r>
-          </a:p>
-          <a:p>
-            <a:r>
-              <a:rPr lang="en-US" dirty="0"/>
-              <a:t>However, there are nuances! There are many signals that we need to go through</a:t>
+              <a:rPr lang="en-US" dirty="0"/>
+              <a:t>https://github.com/Wangstonn/ww_uhd/tree/master/fpga/usrp3/lib/dsp</a:t>
             </a:r>
           </a:p>
         </p:txBody>
@@ -6015,7 +6420,7 @@
     </p:spTree>
     <p:extLst>
       <p:ext uri="{BB962C8B-B14F-4D97-AF65-F5344CB8AC3E}">
-        <p14:creationId xmlns:p14="http://schemas.microsoft.com/office/powerpoint/2010/main" val="2263773463"/>
+        <p14:creationId xmlns:p14="http://schemas.microsoft.com/office/powerpoint/2010/main" val="641796369"/>
       </p:ext>
     </p:extLst>
   </p:cSld>
@@ -6047,7 +6452,7 @@
           <p:cNvPr id="2" name="Title 1">
             <a:extLst>
               <a:ext uri="{FF2B5EF4-FFF2-40B4-BE49-F238E27FC236}">
-                <a16:creationId xmlns:a16="http://schemas.microsoft.com/office/drawing/2014/main" id="{D078B0CE-F18C-2F17-AF69-3E236D3AEA45}"/>
+                <a16:creationId xmlns:a16="http://schemas.microsoft.com/office/drawing/2014/main" id="{73927D09-DFF1-1FDC-FB0E-9AC397445E69}"/>
               </a:ext>
             </a:extLst>
           </p:cNvPr>
@@ -6063,7 +6468,10 @@
           <a:bodyPr/>
           <a:lstStyle/>
           <a:p>
-            <a:endParaRPr lang="en-US"/>
+            <a:r>
+              <a:rPr lang="en-US" dirty="0"/>
+              <a:t>General useful information</a:t>
+            </a:r>
           </a:p>
         </p:txBody>
       </p:sp>
@@ -6072,7 +6480,7 @@
           <p:cNvPr id="3" name="Content Placeholder 2">
             <a:extLst>
               <a:ext uri="{FF2B5EF4-FFF2-40B4-BE49-F238E27FC236}">
-                <a16:creationId xmlns:a16="http://schemas.microsoft.com/office/drawing/2014/main" id="{8158A2A7-97C4-1EE3-BD3F-1C1DEA1ECE7D}"/>
+                <a16:creationId xmlns:a16="http://schemas.microsoft.com/office/drawing/2014/main" id="{1E54288F-A9A8-99A3-E9D8-4A490850C70B}"/>
               </a:ext>
             </a:extLst>
           </p:cNvPr>
@@ -6088,20 +6496,11 @@
           <a:bodyPr/>
           <a:lstStyle/>
           <a:p>
-            <a:r>
-              <a:rPr lang="en-US" dirty="0"/>
-              <a:t>Compilation:</a:t>
-            </a:r>
-          </a:p>
-          <a:p>
-            <a:pPr marL="457200" lvl="1" indent="0">
-              <a:buNone/>
-            </a:pPr>
             <a:r>
               <a:rPr lang="en-US" dirty="0">
                 <a:hlinkClick r:id="rId2"/>
               </a:rPr>
-              <a:t>https://github.com/EttusResearch/uhd/blob/master/fpga/usrp3/top/x300/Makefile.x300.inc</a:t>
+              <a:t>https://www.youtube.com/watch?app=desktop&amp;v=PNMOwhEHE6w</a:t>
             </a:r>
             <a:r>
               <a:rPr lang="en-US" dirty="0"/>
@@ -6109,31 +6508,48 @@
             </a:r>
           </a:p>
           <a:p>
-            <a:pPr marL="457200" lvl="1" indent="0">
-              <a:buNone/>
-            </a:pPr>
-            <a:r>
-              <a:rPr lang="en-US" dirty="0"/>
-              <a:t>Contains the </a:t>
-            </a:r>
-            <a:r>
-              <a:rPr lang="en-US" dirty="0" err="1"/>
-              <a:t>makefiles</a:t>
-            </a:r>
-            <a:r>
-              <a:rPr lang="en-US" dirty="0"/>
-              <a:t> needed to compile the project</a:t>
-            </a:r>
-          </a:p>
-          <a:p>
-            <a:endParaRPr lang="en-US" dirty="0"/>
+            <a:r>
+              <a:rPr lang="en-US" dirty="0">
+                <a:hlinkClick r:id="rId3"/>
+              </a:rPr>
+              <a:t>https://www.youtube.com/watch?v=wqKNUXDdIvU&amp;t=1811s</a:t>
+            </a:r>
+            <a:r>
+              <a:rPr lang="en-US" dirty="0"/>
+              <a:t> </a:t>
+            </a:r>
+            <a:br>
+              <a:rPr lang="en-US" dirty="0"/>
+            </a:br>
+            <a:r>
+              <a:rPr lang="en-US" dirty="0">
+                <a:hlinkClick r:id="rId4"/>
+              </a:rPr>
+              <a:t>https://en.wikipedia.org/wiki/Stochastic_resonance</a:t>
+            </a:r>
+            <a:r>
+              <a:rPr lang="en-US" dirty="0"/>
+              <a:t> </a:t>
+            </a:r>
+          </a:p>
+          <a:p>
+            <a:r>
+              <a:rPr lang="en-US" dirty="0">
+                <a:hlinkClick r:id="rId5"/>
+              </a:rPr>
+              <a:t>https://www.youtube.com/watch?v=FxciG7nW-J0</a:t>
+            </a:r>
+            <a:r>
+              <a:rPr lang="en-US" dirty="0"/>
+              <a:t> </a:t>
+            </a:r>
           </a:p>
         </p:txBody>
       </p:sp>
     </p:spTree>
     <p:extLst>
       <p:ext uri="{BB962C8B-B14F-4D97-AF65-F5344CB8AC3E}">
-        <p14:creationId xmlns:p14="http://schemas.microsoft.com/office/powerpoint/2010/main" val="4009249910"/>
+        <p14:creationId xmlns:p14="http://schemas.microsoft.com/office/powerpoint/2010/main" val="4125737294"/>
       </p:ext>
     </p:extLst>
   </p:cSld>
@@ -6311,6 +6727,544 @@
           <p:cNvPr id="2" name="Title 1">
             <a:extLst>
               <a:ext uri="{FF2B5EF4-FFF2-40B4-BE49-F238E27FC236}">
+                <a16:creationId xmlns:a16="http://schemas.microsoft.com/office/drawing/2014/main" id="{D440D84B-7064-96C9-54AD-7EE2E9DFDB61}"/>
+              </a:ext>
+            </a:extLst>
+          </p:cNvPr>
+          <p:cNvSpPr>
+            <a:spLocks noGrp="1"/>
+          </p:cNvSpPr>
+          <p:nvPr>
+            <p:ph type="title"/>
+          </p:nvPr>
+        </p:nvSpPr>
+        <p:spPr/>
+        <p:txBody>
+          <a:bodyPr/>
+          <a:lstStyle/>
+          <a:p>
+            <a:r>
+              <a:rPr lang="en-US" dirty="0"/>
+              <a:t>Nonideality correction</a:t>
+            </a:r>
+          </a:p>
+        </p:txBody>
+      </p:sp>
+      <p:sp>
+        <p:nvSpPr>
+          <p:cNvPr id="3" name="Content Placeholder 2">
+            <a:extLst>
+              <a:ext uri="{FF2B5EF4-FFF2-40B4-BE49-F238E27FC236}">
+                <a16:creationId xmlns:a16="http://schemas.microsoft.com/office/drawing/2014/main" id="{32ABC283-D191-0CB8-C67F-64BA7060714F}"/>
+              </a:ext>
+            </a:extLst>
+          </p:cNvPr>
+          <p:cNvSpPr>
+            <a:spLocks noGrp="1"/>
+          </p:cNvSpPr>
+          <p:nvPr>
+            <p:ph idx="1"/>
+          </p:nvPr>
+        </p:nvSpPr>
+        <p:spPr/>
+        <p:txBody>
+          <a:bodyPr/>
+          <a:lstStyle/>
+          <a:p>
+            <a:r>
+              <a:rPr lang="en-US" dirty="0" err="1"/>
+              <a:t>fe_control</a:t>
+            </a:r>
+            <a:r>
+              <a:rPr lang="en-US" dirty="0"/>
+              <a:t> sits between x300 and </a:t>
+            </a:r>
+            <a:r>
+              <a:rPr lang="en-US" dirty="0" err="1"/>
+              <a:t>adc</a:t>
+            </a:r>
+            <a:r>
+              <a:rPr lang="en-US" dirty="0"/>
+              <a:t> (CHECK)</a:t>
+            </a:r>
+          </a:p>
+          <a:p>
+            <a:r>
+              <a:rPr lang="en-US" dirty="0">
+                <a:hlinkClick r:id="rId2"/>
+              </a:rPr>
+              <a:t>https://github.com/Wangstonn/ww_uhd/blob/master/fpga/usrp3/lib/control/fe_control.v#L14</a:t>
+            </a:r>
+            <a:endParaRPr lang="en-US" dirty="0"/>
+          </a:p>
+          <a:p>
+            <a:r>
+              <a:rPr lang="en-US" dirty="0"/>
+              <a:t>Performs DC offset correction, </a:t>
+            </a:r>
+            <a:r>
+              <a:rPr lang="en-US" dirty="0" err="1"/>
+              <a:t>etc</a:t>
+            </a:r>
+            <a:endParaRPr lang="en-US" dirty="0"/>
+          </a:p>
+          <a:p>
+            <a:r>
+              <a:rPr lang="en-US" dirty="0">
+                <a:hlinkClick r:id="rId3"/>
+              </a:rPr>
+              <a:t>https://github.com/Wangstonn/ww_uhd/blob/master/fpga/usrp3/lib/rfnoc/blocks/rfnoc_block_radio/tx_frontend_gen3.v#L8</a:t>
+            </a:r>
+            <a:r>
+              <a:rPr lang="en-US" dirty="0"/>
+              <a:t> </a:t>
+            </a:r>
+          </a:p>
+        </p:txBody>
+      </p:sp>
+    </p:spTree>
+    <p:extLst>
+      <p:ext uri="{BB962C8B-B14F-4D97-AF65-F5344CB8AC3E}">
+        <p14:creationId xmlns:p14="http://schemas.microsoft.com/office/powerpoint/2010/main" val="3650599101"/>
+      </p:ext>
+    </p:extLst>
+  </p:cSld>
+  <p:clrMapOvr>
+    <a:masterClrMapping/>
+  </p:clrMapOvr>
+</p:sld>
+</file>
+
+<file path=ppt/slides/slide21.xml><?xml version="1.0" encoding="utf-8"?>
+<p:sld xmlns:a="http://schemas.openxmlformats.org/drawingml/2006/main" xmlns:r="http://schemas.openxmlformats.org/officeDocument/2006/relationships" xmlns:p="http://schemas.openxmlformats.org/presentationml/2006/main">
+  <p:cSld>
+    <p:spTree>
+      <p:nvGrpSpPr>
+        <p:cNvPr id="1" name=""/>
+        <p:cNvGrpSpPr/>
+        <p:nvPr/>
+      </p:nvGrpSpPr>
+      <p:grpSpPr>
+        <a:xfrm>
+          <a:off x="0" y="0"/>
+          <a:ext cx="0" cy="0"/>
+          <a:chOff x="0" y="0"/>
+          <a:chExt cx="0" cy="0"/>
+        </a:xfrm>
+      </p:grpSpPr>
+      <p:sp>
+        <p:nvSpPr>
+          <p:cNvPr id="2" name="Title 1">
+            <a:extLst>
+              <a:ext uri="{FF2B5EF4-FFF2-40B4-BE49-F238E27FC236}">
+                <a16:creationId xmlns:a16="http://schemas.microsoft.com/office/drawing/2014/main" id="{8FCA704D-EE47-D3EC-C7F0-B8E06F740B7A}"/>
+              </a:ext>
+            </a:extLst>
+          </p:cNvPr>
+          <p:cNvSpPr>
+            <a:spLocks noGrp="1"/>
+          </p:cNvSpPr>
+          <p:nvPr>
+            <p:ph type="title"/>
+          </p:nvPr>
+        </p:nvSpPr>
+        <p:spPr/>
+        <p:txBody>
+          <a:bodyPr/>
+          <a:lstStyle/>
+          <a:p>
+            <a:r>
+              <a:rPr lang="en-US" dirty="0"/>
+              <a:t>Debug advice</a:t>
+            </a:r>
+          </a:p>
+        </p:txBody>
+      </p:sp>
+      <p:sp>
+        <p:nvSpPr>
+          <p:cNvPr id="3" name="Content Placeholder 2">
+            <a:extLst>
+              <a:ext uri="{FF2B5EF4-FFF2-40B4-BE49-F238E27FC236}">
+                <a16:creationId xmlns:a16="http://schemas.microsoft.com/office/drawing/2014/main" id="{D2694319-EF79-8A47-0208-AA5658E030DF}"/>
+              </a:ext>
+            </a:extLst>
+          </p:cNvPr>
+          <p:cNvSpPr>
+            <a:spLocks noGrp="1"/>
+          </p:cNvSpPr>
+          <p:nvPr>
+            <p:ph idx="1"/>
+          </p:nvPr>
+        </p:nvSpPr>
+        <p:spPr/>
+        <p:txBody>
+          <a:bodyPr/>
+          <a:lstStyle/>
+          <a:p>
+            <a:r>
+              <a:rPr lang="en-US" dirty="0"/>
+              <a:t>(* </a:t>
+            </a:r>
+            <a:r>
+              <a:rPr lang="en-US" dirty="0" err="1"/>
+              <a:t>dont_touch</a:t>
+            </a:r>
+            <a:r>
+              <a:rPr lang="en-US" dirty="0"/>
+              <a:t> = "true" , </a:t>
+            </a:r>
+            <a:r>
+              <a:rPr lang="en-US" dirty="0" err="1"/>
+              <a:t>mark_debug</a:t>
+            </a:r>
+            <a:r>
+              <a:rPr lang="en-US" dirty="0"/>
+              <a:t> = "true" *) logic </a:t>
+            </a:r>
+            <a:r>
+              <a:rPr lang="en-US" dirty="0" err="1"/>
+              <a:t>fb_o_ctr_r</a:t>
+            </a:r>
+            <a:endParaRPr lang="en-US" dirty="0"/>
+          </a:p>
+          <a:p>
+            <a:r>
+              <a:rPr lang="en-US" dirty="0"/>
+              <a:t>(* DONT_TOUCH = "yes" *) </a:t>
+            </a:r>
+            <a:r>
+              <a:rPr lang="en-US" dirty="0" err="1"/>
+              <a:t>dest</a:t>
+            </a:r>
+            <a:r>
+              <a:rPr lang="en-US" dirty="0"/>
+              <a:t> </a:t>
+            </a:r>
+            <a:r>
+              <a:rPr lang="en-US" dirty="0" err="1"/>
+              <a:t>dest_dut</a:t>
+            </a:r>
+            <a:r>
+              <a:rPr lang="en-US" dirty="0"/>
+              <a:t>( )</a:t>
+            </a:r>
+          </a:p>
+        </p:txBody>
+      </p:sp>
+    </p:spTree>
+    <p:extLst>
+      <p:ext uri="{BB962C8B-B14F-4D97-AF65-F5344CB8AC3E}">
+        <p14:creationId xmlns:p14="http://schemas.microsoft.com/office/powerpoint/2010/main" val="726467427"/>
+      </p:ext>
+    </p:extLst>
+  </p:cSld>
+  <p:clrMapOvr>
+    <a:masterClrMapping/>
+  </p:clrMapOvr>
+</p:sld>
+</file>
+
+<file path=ppt/slides/slide22.xml><?xml version="1.0" encoding="utf-8"?>
+<p:sld xmlns:a="http://schemas.openxmlformats.org/drawingml/2006/main" xmlns:r="http://schemas.openxmlformats.org/officeDocument/2006/relationships" xmlns:p="http://schemas.openxmlformats.org/presentationml/2006/main">
+  <p:cSld>
+    <p:spTree>
+      <p:nvGrpSpPr>
+        <p:cNvPr id="1" name=""/>
+        <p:cNvGrpSpPr/>
+        <p:nvPr/>
+      </p:nvGrpSpPr>
+      <p:grpSpPr>
+        <a:xfrm>
+          <a:off x="0" y="0"/>
+          <a:ext cx="0" cy="0"/>
+          <a:chOff x="0" y="0"/>
+          <a:chExt cx="0" cy="0"/>
+        </a:xfrm>
+      </p:grpSpPr>
+      <p:sp>
+        <p:nvSpPr>
+          <p:cNvPr id="2" name="Title 1">
+            <a:extLst>
+              <a:ext uri="{FF2B5EF4-FFF2-40B4-BE49-F238E27FC236}">
+                <a16:creationId xmlns:a16="http://schemas.microsoft.com/office/drawing/2014/main" id="{9D06B023-DC6A-41F3-4AE9-E867DC09A16F}"/>
+              </a:ext>
+            </a:extLst>
+          </p:cNvPr>
+          <p:cNvSpPr>
+            <a:spLocks noGrp="1"/>
+          </p:cNvSpPr>
+          <p:nvPr>
+            <p:ph type="title"/>
+          </p:nvPr>
+        </p:nvSpPr>
+        <p:spPr/>
+        <p:txBody>
+          <a:bodyPr/>
+          <a:lstStyle/>
+          <a:p>
+            <a:r>
+              <a:rPr lang="en-US" dirty="0"/>
+              <a:t>Repo overview</a:t>
+            </a:r>
+          </a:p>
+        </p:txBody>
+      </p:sp>
+      <p:sp>
+        <p:nvSpPr>
+          <p:cNvPr id="3" name="Content Placeholder 2">
+            <a:extLst>
+              <a:ext uri="{FF2B5EF4-FFF2-40B4-BE49-F238E27FC236}">
+                <a16:creationId xmlns:a16="http://schemas.microsoft.com/office/drawing/2014/main" id="{F12D3D4B-9539-38B4-187E-83D8AAB01749}"/>
+              </a:ext>
+            </a:extLst>
+          </p:cNvPr>
+          <p:cNvSpPr>
+            <a:spLocks noGrp="1"/>
+          </p:cNvSpPr>
+          <p:nvPr>
+            <p:ph idx="1"/>
+          </p:nvPr>
+        </p:nvSpPr>
+        <p:spPr/>
+        <p:txBody>
+          <a:bodyPr>
+            <a:normAutofit/>
+          </a:bodyPr>
+          <a:lstStyle/>
+          <a:p>
+            <a:r>
+              <a:rPr lang="en-US" dirty="0" err="1"/>
+              <a:t>uhd</a:t>
+            </a:r>
+            <a:r>
+              <a:rPr lang="en-US" dirty="0"/>
+              <a:t>/</a:t>
+            </a:r>
+            <a:r>
+              <a:rPr lang="en-US" dirty="0" err="1"/>
+              <a:t>fpga</a:t>
+            </a:r>
+            <a:r>
+              <a:rPr lang="en-US" dirty="0"/>
+              <a:t> contains the Verilog used on the USRPs</a:t>
+            </a:r>
+          </a:p>
+          <a:p>
+            <a:pPr marL="457200" lvl="1" indent="0">
+              <a:buNone/>
+            </a:pPr>
+            <a:r>
+              <a:rPr lang="en-US" dirty="0">
+                <a:hlinkClick r:id="rId2"/>
+              </a:rPr>
+              <a:t>https://github.com/EttusResearch/uhd/tree/master/fpga/usrp3/top/x300</a:t>
+            </a:r>
+            <a:endParaRPr lang="en-US" dirty="0"/>
+          </a:p>
+          <a:p>
+            <a:r>
+              <a:rPr lang="en-US" dirty="0"/>
+              <a:t>All the action happens in x300_core</a:t>
+            </a:r>
+          </a:p>
+          <a:p>
+            <a:pPr lvl="1"/>
+            <a:r>
+              <a:rPr lang="en-US" dirty="0"/>
+              <a:t>handles communication with PC, </a:t>
+            </a:r>
+            <a:r>
+              <a:rPr lang="en-US" dirty="0" err="1"/>
+              <a:t>gpio</a:t>
+            </a:r>
+            <a:r>
+              <a:rPr lang="en-US" dirty="0"/>
+              <a:t>, </a:t>
+            </a:r>
+            <a:r>
+              <a:rPr lang="en-US" dirty="0" err="1"/>
+              <a:t>adc</a:t>
+            </a:r>
+            <a:r>
+              <a:rPr lang="en-US" dirty="0"/>
+              <a:t>/</a:t>
+            </a:r>
+            <a:r>
+              <a:rPr lang="en-US" dirty="0" err="1"/>
+              <a:t>dac</a:t>
+            </a:r>
+            <a:r>
+              <a:rPr lang="en-US" dirty="0"/>
+              <a:t>, nonideality correction</a:t>
+            </a:r>
+          </a:p>
+          <a:p>
+            <a:r>
+              <a:rPr lang="en-US" dirty="0"/>
+              <a:t>We will insert our module here</a:t>
+            </a:r>
+          </a:p>
+          <a:p>
+            <a:r>
+              <a:rPr lang="en-US" dirty="0"/>
+              <a:t>However, there are nuances! There are many signals that we need to go through</a:t>
+            </a:r>
+          </a:p>
+        </p:txBody>
+      </p:sp>
+    </p:spTree>
+    <p:extLst>
+      <p:ext uri="{BB962C8B-B14F-4D97-AF65-F5344CB8AC3E}">
+        <p14:creationId xmlns:p14="http://schemas.microsoft.com/office/powerpoint/2010/main" val="2263773463"/>
+      </p:ext>
+    </p:extLst>
+  </p:cSld>
+  <p:clrMapOvr>
+    <a:masterClrMapping/>
+  </p:clrMapOvr>
+</p:sld>
+</file>
+
+<file path=ppt/slides/slide23.xml><?xml version="1.0" encoding="utf-8"?>
+<p:sld xmlns:a="http://schemas.openxmlformats.org/drawingml/2006/main" xmlns:r="http://schemas.openxmlformats.org/officeDocument/2006/relationships" xmlns:p="http://schemas.openxmlformats.org/presentationml/2006/main">
+  <p:cSld>
+    <p:spTree>
+      <p:nvGrpSpPr>
+        <p:cNvPr id="1" name=""/>
+        <p:cNvGrpSpPr/>
+        <p:nvPr/>
+      </p:nvGrpSpPr>
+      <p:grpSpPr>
+        <a:xfrm>
+          <a:off x="0" y="0"/>
+          <a:ext cx="0" cy="0"/>
+          <a:chOff x="0" y="0"/>
+          <a:chExt cx="0" cy="0"/>
+        </a:xfrm>
+      </p:grpSpPr>
+      <p:sp>
+        <p:nvSpPr>
+          <p:cNvPr id="2" name="Title 1">
+            <a:extLst>
+              <a:ext uri="{FF2B5EF4-FFF2-40B4-BE49-F238E27FC236}">
+                <a16:creationId xmlns:a16="http://schemas.microsoft.com/office/drawing/2014/main" id="{D078B0CE-F18C-2F17-AF69-3E236D3AEA45}"/>
+              </a:ext>
+            </a:extLst>
+          </p:cNvPr>
+          <p:cNvSpPr>
+            <a:spLocks noGrp="1"/>
+          </p:cNvSpPr>
+          <p:nvPr>
+            <p:ph type="title"/>
+          </p:nvPr>
+        </p:nvSpPr>
+        <p:spPr/>
+        <p:txBody>
+          <a:bodyPr/>
+          <a:lstStyle/>
+          <a:p>
+            <a:endParaRPr lang="en-US"/>
+          </a:p>
+        </p:txBody>
+      </p:sp>
+      <p:sp>
+        <p:nvSpPr>
+          <p:cNvPr id="3" name="Content Placeholder 2">
+            <a:extLst>
+              <a:ext uri="{FF2B5EF4-FFF2-40B4-BE49-F238E27FC236}">
+                <a16:creationId xmlns:a16="http://schemas.microsoft.com/office/drawing/2014/main" id="{8158A2A7-97C4-1EE3-BD3F-1C1DEA1ECE7D}"/>
+              </a:ext>
+            </a:extLst>
+          </p:cNvPr>
+          <p:cNvSpPr>
+            <a:spLocks noGrp="1"/>
+          </p:cNvSpPr>
+          <p:nvPr>
+            <p:ph idx="1"/>
+          </p:nvPr>
+        </p:nvSpPr>
+        <p:spPr/>
+        <p:txBody>
+          <a:bodyPr/>
+          <a:lstStyle/>
+          <a:p>
+            <a:r>
+              <a:rPr lang="en-US" dirty="0"/>
+              <a:t>Compilation:</a:t>
+            </a:r>
+          </a:p>
+          <a:p>
+            <a:pPr marL="457200" lvl="1" indent="0">
+              <a:buNone/>
+            </a:pPr>
+            <a:r>
+              <a:rPr lang="en-US" dirty="0">
+                <a:hlinkClick r:id="rId2"/>
+              </a:rPr>
+              <a:t>https://github.com/EttusResearch/uhd/blob/master/fpga/usrp3/top/x300/Makefile.x300.inc</a:t>
+            </a:r>
+            <a:r>
+              <a:rPr lang="en-US" dirty="0"/>
+              <a:t> </a:t>
+            </a:r>
+          </a:p>
+          <a:p>
+            <a:pPr marL="457200" lvl="1" indent="0">
+              <a:buNone/>
+            </a:pPr>
+            <a:r>
+              <a:rPr lang="en-US" dirty="0"/>
+              <a:t>Contains the </a:t>
+            </a:r>
+            <a:r>
+              <a:rPr lang="en-US" dirty="0" err="1"/>
+              <a:t>makefiles</a:t>
+            </a:r>
+            <a:r>
+              <a:rPr lang="en-US" dirty="0"/>
+              <a:t> needed to compile the project</a:t>
+            </a:r>
+          </a:p>
+          <a:p>
+            <a:endParaRPr lang="en-US" dirty="0"/>
+          </a:p>
+        </p:txBody>
+      </p:sp>
+    </p:spTree>
+    <p:extLst>
+      <p:ext uri="{BB962C8B-B14F-4D97-AF65-F5344CB8AC3E}">
+        <p14:creationId xmlns:p14="http://schemas.microsoft.com/office/powerpoint/2010/main" val="4009249910"/>
+      </p:ext>
+    </p:extLst>
+  </p:cSld>
+  <p:clrMapOvr>
+    <a:masterClrMapping/>
+  </p:clrMapOvr>
+</p:sld>
+</file>
+
+<file path=ppt/slides/slide24.xml><?xml version="1.0" encoding="utf-8"?>
+<p:sld xmlns:a="http://schemas.openxmlformats.org/drawingml/2006/main" xmlns:r="http://schemas.openxmlformats.org/officeDocument/2006/relationships" xmlns:p="http://schemas.openxmlformats.org/presentationml/2006/main">
+  <p:cSld>
+    <p:spTree>
+      <p:nvGrpSpPr>
+        <p:cNvPr id="1" name=""/>
+        <p:cNvGrpSpPr/>
+        <p:nvPr/>
+      </p:nvGrpSpPr>
+      <p:grpSpPr>
+        <a:xfrm>
+          <a:off x="0" y="0"/>
+          <a:ext cx="0" cy="0"/>
+          <a:chOff x="0" y="0"/>
+          <a:chExt cx="0" cy="0"/>
+        </a:xfrm>
+      </p:grpSpPr>
+      <p:sp>
+        <p:nvSpPr>
+          <p:cNvPr id="2" name="Title 1">
+            <a:extLst>
+              <a:ext uri="{FF2B5EF4-FFF2-40B4-BE49-F238E27FC236}">
                 <a16:creationId xmlns:a16="http://schemas.microsoft.com/office/drawing/2014/main" id="{120A129F-F3CA-63BC-A582-27486C38D717}"/>
               </a:ext>
             </a:extLst>
@@ -6442,6 +7396,590 @@
   <p:clrMapOvr>
     <a:masterClrMapping/>
   </p:clrMapOvr>
+</p:sld>
+</file>
+
+<file path=ppt/slides/slide25.xml><?xml version="1.0" encoding="utf-8"?>
+<p:sld xmlns:a="http://schemas.openxmlformats.org/drawingml/2006/main" xmlns:r="http://schemas.openxmlformats.org/officeDocument/2006/relationships" xmlns:p="http://schemas.openxmlformats.org/presentationml/2006/main">
+  <p:cSld>
+    <p:spTree>
+      <p:nvGrpSpPr>
+        <p:cNvPr id="1" name=""/>
+        <p:cNvGrpSpPr/>
+        <p:nvPr/>
+      </p:nvGrpSpPr>
+      <p:grpSpPr>
+        <a:xfrm>
+          <a:off x="0" y="0"/>
+          <a:ext cx="0" cy="0"/>
+          <a:chOff x="0" y="0"/>
+          <a:chExt cx="0" cy="0"/>
+        </a:xfrm>
+      </p:grpSpPr>
+      <p:sp>
+        <p:nvSpPr>
+          <p:cNvPr id="2" name="Title 1">
+            <a:extLst>
+              <a:ext uri="{FF2B5EF4-FFF2-40B4-BE49-F238E27FC236}">
+                <a16:creationId xmlns:a16="http://schemas.microsoft.com/office/drawing/2014/main" id="{474FBC8C-7155-6884-00C1-4E81E87EEE32}"/>
+              </a:ext>
+            </a:extLst>
+          </p:cNvPr>
+          <p:cNvSpPr>
+            <a:spLocks noGrp="1"/>
+          </p:cNvSpPr>
+          <p:nvPr>
+            <p:ph type="title"/>
+          </p:nvPr>
+        </p:nvSpPr>
+        <p:spPr/>
+        <p:txBody>
+          <a:bodyPr>
+            <a:normAutofit fontScale="90000"/>
+          </a:bodyPr>
+          <a:lstStyle/>
+          <a:p>
+            <a:pPr algn="ctr"/>
+            <a:r>
+              <a:rPr lang="en-US" dirty="0"/>
+              <a:t>USRP Processing Delay</a:t>
+            </a:r>
+          </a:p>
+        </p:txBody>
+      </p:sp>
+      <p:sp>
+        <p:nvSpPr>
+          <p:cNvPr id="3" name="Text Placeholder 2">
+            <a:extLst>
+              <a:ext uri="{FF2B5EF4-FFF2-40B4-BE49-F238E27FC236}">
+                <a16:creationId xmlns:a16="http://schemas.microsoft.com/office/drawing/2014/main" id="{E9412DD0-E338-3F7D-7351-6ECC28968CCA}"/>
+              </a:ext>
+            </a:extLst>
+          </p:cNvPr>
+          <p:cNvSpPr>
+            <a:spLocks noGrp="1"/>
+          </p:cNvSpPr>
+          <p:nvPr>
+            <p:ph type="body" idx="1"/>
+          </p:nvPr>
+        </p:nvSpPr>
+        <p:spPr>
+          <a:xfrm>
+            <a:off x="268289" y="868681"/>
+            <a:ext cx="7529990" cy="5462272"/>
+          </a:xfrm>
+        </p:spPr>
+        <p:txBody>
+          <a:bodyPr>
+            <a:normAutofit/>
+          </a:bodyPr>
+          <a:lstStyle/>
+          <a:p>
+            <a:pPr marL="0" indent="0" algn="ctr">
+              <a:buNone/>
+            </a:pPr>
+            <a:r>
+              <a:rPr lang="en-US" u="sng" dirty="0"/>
+              <a:t>USRP Loopback Test</a:t>
+            </a:r>
+          </a:p>
+          <a:p>
+            <a:r>
+              <a:rPr lang="en-US" dirty="0"/>
+              <a:t>USRP Processing Delay must be accounted for in implementation for timing</a:t>
+            </a:r>
+          </a:p>
+          <a:p>
+            <a:r>
+              <a:rPr lang="en-US" dirty="0"/>
+              <a:t>Get USRP TX and RX processing delay</a:t>
+            </a:r>
+          </a:p>
+          <a:p>
+            <a:r>
+              <a:rPr lang="en-US" dirty="0"/>
+              <a:t>Processing Delay contains ADC, DAC, and Analog Frontend processing times. </a:t>
+            </a:r>
+          </a:p>
+          <a:p>
+            <a:r>
+              <a:rPr lang="en-US" dirty="0"/>
+              <a:t>An estimated constant delay was measured from USRP. Similar results from an additional USRPS with same wire.</a:t>
+            </a:r>
+          </a:p>
+          <a:p>
+            <a:r>
+              <a:rPr lang="en-US" dirty="0"/>
+              <a:t>Wired Cable used to connect. Wire Length is about 8 inches.</a:t>
+            </a:r>
+          </a:p>
+          <a:p>
+            <a:endParaRPr lang="en-US" dirty="0"/>
+          </a:p>
+        </p:txBody>
+      </p:sp>
+      <p:sp>
+        <p:nvSpPr>
+          <p:cNvPr id="5" name="Flowchart: Manual Operation 4">
+            <a:extLst>
+              <a:ext uri="{FF2B5EF4-FFF2-40B4-BE49-F238E27FC236}">
+                <a16:creationId xmlns:a16="http://schemas.microsoft.com/office/drawing/2014/main" id="{E85D2BF5-4856-D614-C9FB-C1EF1475BA1F}"/>
+              </a:ext>
+            </a:extLst>
+          </p:cNvPr>
+          <p:cNvSpPr/>
+          <p:nvPr/>
+        </p:nvSpPr>
+        <p:spPr>
+          <a:xfrm>
+            <a:off x="10199178" y="2296513"/>
+            <a:ext cx="553626" cy="336113"/>
+          </a:xfrm>
+          <a:prstGeom prst="flowChartManualOperation">
+            <a:avLst/>
+          </a:prstGeom>
+          <a:solidFill>
+            <a:schemeClr val="accent2"/>
+          </a:solidFill>
+        </p:spPr>
+        <p:style>
+          <a:lnRef idx="2">
+            <a:schemeClr val="dk1"/>
+          </a:lnRef>
+          <a:fillRef idx="1">
+            <a:schemeClr val="lt1"/>
+          </a:fillRef>
+          <a:effectRef idx="0">
+            <a:schemeClr val="dk1"/>
+          </a:effectRef>
+          <a:fontRef idx="minor">
+            <a:schemeClr val="dk1"/>
+          </a:fontRef>
+        </p:style>
+        <p:txBody>
+          <a:bodyPr rtlCol="0" anchor="ctr"/>
+          <a:lstStyle/>
+          <a:p>
+            <a:pPr marL="0" marR="0" lvl="0" indent="0" algn="ctr" defTabSz="914400" rtl="0" eaLnBrk="1" fontAlgn="auto" latinLnBrk="0" hangingPunct="1">
+              <a:lnSpc>
+                <a:spcPct val="100000"/>
+              </a:lnSpc>
+              <a:spcBef>
+                <a:spcPts val="0"/>
+              </a:spcBef>
+              <a:spcAft>
+                <a:spcPts val="0"/>
+              </a:spcAft>
+              <a:buClrTx/>
+              <a:buSzTx/>
+              <a:buFontTx/>
+              <a:buNone/>
+              <a:tabLst/>
+              <a:defRPr/>
+            </a:pPr>
+            <a:r>
+              <a:rPr kumimoji="0" lang="en-US" sz="800" b="1" i="0" u="none" strike="noStrike" kern="1200" cap="none" spc="0" normalizeH="0" baseline="0" noProof="0" dirty="0">
+                <a:ln>
+                  <a:noFill/>
+                </a:ln>
+                <a:solidFill>
+                  <a:prstClr val="black"/>
+                </a:solidFill>
+                <a:effectLst/>
+                <a:uLnTx/>
+                <a:uFillTx/>
+                <a:latin typeface="Calibri" panose="020F0502020204030204"/>
+                <a:ea typeface="+mn-ea"/>
+                <a:cs typeface="+mn-cs"/>
+              </a:rPr>
+              <a:t>RX</a:t>
+            </a:r>
+          </a:p>
+        </p:txBody>
+      </p:sp>
+      <p:sp>
+        <p:nvSpPr>
+          <p:cNvPr id="6" name="Rectangle 5">
+            <a:extLst>
+              <a:ext uri="{FF2B5EF4-FFF2-40B4-BE49-F238E27FC236}">
+                <a16:creationId xmlns:a16="http://schemas.microsoft.com/office/drawing/2014/main" id="{7CDF469A-68BF-B47F-19A3-FB6CB49263C1}"/>
+              </a:ext>
+            </a:extLst>
+          </p:cNvPr>
+          <p:cNvSpPr/>
+          <p:nvPr/>
+        </p:nvSpPr>
+        <p:spPr>
+          <a:xfrm>
+            <a:off x="9158987" y="2632626"/>
+            <a:ext cx="1593817" cy="571645"/>
+          </a:xfrm>
+          <a:prstGeom prst="rect">
+            <a:avLst/>
+          </a:prstGeom>
+        </p:spPr>
+        <p:style>
+          <a:lnRef idx="2">
+            <a:schemeClr val="dk1"/>
+          </a:lnRef>
+          <a:fillRef idx="1">
+            <a:schemeClr val="lt1"/>
+          </a:fillRef>
+          <a:effectRef idx="0">
+            <a:schemeClr val="dk1"/>
+          </a:effectRef>
+          <a:fontRef idx="minor">
+            <a:schemeClr val="dk1"/>
+          </a:fontRef>
+        </p:style>
+        <p:txBody>
+          <a:bodyPr rtlCol="0" anchor="ctr"/>
+          <a:lstStyle/>
+          <a:p>
+            <a:pPr marL="0" marR="0" lvl="0" indent="0" algn="ctr" defTabSz="914400" rtl="0" eaLnBrk="1" fontAlgn="auto" latinLnBrk="0" hangingPunct="1">
+              <a:lnSpc>
+                <a:spcPct val="100000"/>
+              </a:lnSpc>
+              <a:spcBef>
+                <a:spcPts val="0"/>
+              </a:spcBef>
+              <a:spcAft>
+                <a:spcPts val="0"/>
+              </a:spcAft>
+              <a:buClrTx/>
+              <a:buSzTx/>
+              <a:buFontTx/>
+              <a:buNone/>
+              <a:tabLst/>
+              <a:defRPr/>
+            </a:pPr>
+            <a:r>
+              <a:rPr kumimoji="0" lang="en-US" sz="1800" b="0" i="0" u="none" strike="noStrike" kern="1200" cap="none" spc="0" normalizeH="0" baseline="0" noProof="0" dirty="0">
+                <a:ln>
+                  <a:noFill/>
+                </a:ln>
+                <a:solidFill>
+                  <a:prstClr val="black"/>
+                </a:solidFill>
+                <a:effectLst/>
+                <a:uLnTx/>
+                <a:uFillTx/>
+                <a:latin typeface="Calibri" panose="020F0502020204030204"/>
+                <a:ea typeface="+mn-ea"/>
+                <a:cs typeface="+mn-cs"/>
+              </a:rPr>
+              <a:t>USRP</a:t>
+            </a:r>
+          </a:p>
+        </p:txBody>
+      </p:sp>
+      <p:sp>
+        <p:nvSpPr>
+          <p:cNvPr id="7" name="Flowchart: Manual Operation 6">
+            <a:extLst>
+              <a:ext uri="{FF2B5EF4-FFF2-40B4-BE49-F238E27FC236}">
+                <a16:creationId xmlns:a16="http://schemas.microsoft.com/office/drawing/2014/main" id="{8E7F71A0-BB57-9D4A-A1B5-F703F2BE6E03}"/>
+              </a:ext>
+            </a:extLst>
+          </p:cNvPr>
+          <p:cNvSpPr/>
+          <p:nvPr/>
+        </p:nvSpPr>
+        <p:spPr>
+          <a:xfrm>
+            <a:off x="9239777" y="2280029"/>
+            <a:ext cx="553626" cy="336113"/>
+          </a:xfrm>
+          <a:prstGeom prst="flowChartManualOperation">
+            <a:avLst/>
+          </a:prstGeom>
+          <a:solidFill>
+            <a:schemeClr val="accent1"/>
+          </a:solidFill>
+        </p:spPr>
+        <p:style>
+          <a:lnRef idx="2">
+            <a:schemeClr val="dk1"/>
+          </a:lnRef>
+          <a:fillRef idx="1">
+            <a:schemeClr val="lt1"/>
+          </a:fillRef>
+          <a:effectRef idx="0">
+            <a:schemeClr val="dk1"/>
+          </a:effectRef>
+          <a:fontRef idx="minor">
+            <a:schemeClr val="dk1"/>
+          </a:fontRef>
+        </p:style>
+        <p:txBody>
+          <a:bodyPr rtlCol="0" anchor="ctr"/>
+          <a:lstStyle/>
+          <a:p>
+            <a:pPr marL="0" marR="0" lvl="0" indent="0" algn="ctr" defTabSz="914400" rtl="0" eaLnBrk="1" fontAlgn="auto" latinLnBrk="0" hangingPunct="1">
+              <a:lnSpc>
+                <a:spcPct val="100000"/>
+              </a:lnSpc>
+              <a:spcBef>
+                <a:spcPts val="0"/>
+              </a:spcBef>
+              <a:spcAft>
+                <a:spcPts val="0"/>
+              </a:spcAft>
+              <a:buClrTx/>
+              <a:buSzTx/>
+              <a:buFontTx/>
+              <a:buNone/>
+              <a:tabLst/>
+              <a:defRPr/>
+            </a:pPr>
+            <a:r>
+              <a:rPr kumimoji="0" lang="en-US" sz="800" b="1" i="0" u="none" strike="noStrike" kern="1200" cap="none" spc="0" normalizeH="0" baseline="0" noProof="0" dirty="0">
+                <a:ln>
+                  <a:noFill/>
+                </a:ln>
+                <a:solidFill>
+                  <a:prstClr val="black"/>
+                </a:solidFill>
+                <a:effectLst/>
+                <a:uLnTx/>
+                <a:uFillTx/>
+                <a:latin typeface="Calibri" panose="020F0502020204030204"/>
+                <a:ea typeface="+mn-ea"/>
+                <a:cs typeface="+mn-cs"/>
+              </a:rPr>
+              <a:t>TX</a:t>
+            </a:r>
+          </a:p>
+        </p:txBody>
+      </p:sp>
+      <p:cxnSp>
+        <p:nvCxnSpPr>
+          <p:cNvPr id="8" name="Connector: Curved 7">
+            <a:extLst>
+              <a:ext uri="{FF2B5EF4-FFF2-40B4-BE49-F238E27FC236}">
+                <a16:creationId xmlns:a16="http://schemas.microsoft.com/office/drawing/2014/main" id="{E8403A7C-0E56-D59C-2E2A-357A9D5FE975}"/>
+              </a:ext>
+            </a:extLst>
+          </p:cNvPr>
+          <p:cNvCxnSpPr>
+            <a:stCxn id="7" idx="0"/>
+            <a:endCxn id="5" idx="0"/>
+          </p:cNvCxnSpPr>
+          <p:nvPr/>
+        </p:nvCxnSpPr>
+        <p:spPr>
+          <a:xfrm rot="16200000" flipH="1">
+            <a:off x="9988048" y="1808571"/>
+            <a:ext cx="16484" cy="959401"/>
+          </a:xfrm>
+          <a:prstGeom prst="curvedConnector3">
+            <a:avLst>
+              <a:gd name="adj1" fmla="val -1386799"/>
+            </a:avLst>
+          </a:prstGeom>
+          <a:ln>
+            <a:headEnd type="triangle"/>
+            <a:tailEnd type="triangle"/>
+          </a:ln>
+        </p:spPr>
+        <p:style>
+          <a:lnRef idx="2">
+            <a:schemeClr val="dk1"/>
+          </a:lnRef>
+          <a:fillRef idx="0">
+            <a:schemeClr val="dk1"/>
+          </a:fillRef>
+          <a:effectRef idx="1">
+            <a:schemeClr val="dk1"/>
+          </a:effectRef>
+          <a:fontRef idx="minor">
+            <a:schemeClr val="tx1"/>
+          </a:fontRef>
+        </p:style>
+      </p:cxnSp>
+    </p:spTree>
+    <p:extLst>
+      <p:ext uri="{BB962C8B-B14F-4D97-AF65-F5344CB8AC3E}">
+        <p14:creationId xmlns:p14="http://schemas.microsoft.com/office/powerpoint/2010/main" val="1258599656"/>
+      </p:ext>
+    </p:extLst>
+  </p:cSld>
+  <p:clrMapOvr>
+    <a:masterClrMapping/>
+  </p:clrMapOvr>
+  <p:transition spd="med"/>
+</p:sld>
+</file>
+
+<file path=ppt/slides/slide26.xml><?xml version="1.0" encoding="utf-8"?>
+<p:sld xmlns:a="http://schemas.openxmlformats.org/drawingml/2006/main" xmlns:r="http://schemas.openxmlformats.org/officeDocument/2006/relationships" xmlns:p="http://schemas.openxmlformats.org/presentationml/2006/main">
+  <p:cSld>
+    <p:spTree>
+      <p:nvGrpSpPr>
+        <p:cNvPr id="1" name=""/>
+        <p:cNvGrpSpPr/>
+        <p:nvPr/>
+      </p:nvGrpSpPr>
+      <p:grpSpPr>
+        <a:xfrm>
+          <a:off x="0" y="0"/>
+          <a:ext cx="0" cy="0"/>
+          <a:chOff x="0" y="0"/>
+          <a:chExt cx="0" cy="0"/>
+        </a:xfrm>
+      </p:grpSpPr>
+      <p:sp>
+        <p:nvSpPr>
+          <p:cNvPr id="2" name="Title 1">
+            <a:extLst>
+              <a:ext uri="{FF2B5EF4-FFF2-40B4-BE49-F238E27FC236}">
+                <a16:creationId xmlns:a16="http://schemas.microsoft.com/office/drawing/2014/main" id="{474FBC8C-7155-6884-00C1-4E81E87EEE32}"/>
+              </a:ext>
+            </a:extLst>
+          </p:cNvPr>
+          <p:cNvSpPr>
+            <a:spLocks noGrp="1"/>
+          </p:cNvSpPr>
+          <p:nvPr>
+            <p:ph type="title"/>
+          </p:nvPr>
+        </p:nvSpPr>
+        <p:spPr/>
+        <p:txBody>
+          <a:bodyPr>
+            <a:normAutofit fontScale="90000"/>
+          </a:bodyPr>
+          <a:lstStyle/>
+          <a:p>
+            <a:pPr algn="ctr"/>
+            <a:r>
+              <a:rPr lang="en-US" dirty="0"/>
+              <a:t>USRP Processing Delay</a:t>
+            </a:r>
+          </a:p>
+        </p:txBody>
+      </p:sp>
+      <p:sp>
+        <p:nvSpPr>
+          <p:cNvPr id="3" name="Text Placeholder 2">
+            <a:extLst>
+              <a:ext uri="{FF2B5EF4-FFF2-40B4-BE49-F238E27FC236}">
+                <a16:creationId xmlns:a16="http://schemas.microsoft.com/office/drawing/2014/main" id="{E9412DD0-E338-3F7D-7351-6ECC28968CCA}"/>
+              </a:ext>
+            </a:extLst>
+          </p:cNvPr>
+          <p:cNvSpPr>
+            <a:spLocks noGrp="1"/>
+          </p:cNvSpPr>
+          <p:nvPr>
+            <p:ph type="body" idx="1"/>
+          </p:nvPr>
+        </p:nvSpPr>
+        <p:spPr>
+          <a:xfrm>
+            <a:off x="268819" y="4934309"/>
+            <a:ext cx="10894292" cy="1396644"/>
+          </a:xfrm>
+        </p:spPr>
+        <p:txBody>
+          <a:bodyPr>
+            <a:normAutofit/>
+          </a:bodyPr>
+          <a:lstStyle/>
+          <a:p>
+            <a:r>
+              <a:rPr lang="en-US" sz="2200" dirty="0"/>
+              <a:t>Estimated Processing Delay = 119 samples at 200M = 0.595 us</a:t>
+            </a:r>
+          </a:p>
+          <a:p>
+            <a:r>
+              <a:rPr lang="en-US" sz="2200" dirty="0"/>
+              <a:t>Processing includes TX path, RX path and Wire length. </a:t>
+            </a:r>
+          </a:p>
+          <a:p>
+            <a:r>
+              <a:rPr lang="en-US" sz="2200" dirty="0"/>
+              <a:t>Wire Length = 8 inches </a:t>
+            </a:r>
+          </a:p>
+          <a:p>
+            <a:endParaRPr lang="en-US" dirty="0"/>
+          </a:p>
+        </p:txBody>
+      </p:sp>
+      <p:pic>
+        <p:nvPicPr>
+          <p:cNvPr id="12" name="Picture 11">
+            <a:extLst>
+              <a:ext uri="{FF2B5EF4-FFF2-40B4-BE49-F238E27FC236}">
+                <a16:creationId xmlns:a16="http://schemas.microsoft.com/office/drawing/2014/main" id="{41987B11-1033-C0AE-6B89-50F86C657643}"/>
+              </a:ext>
+            </a:extLst>
+          </p:cNvPr>
+          <p:cNvPicPr>
+            <a:picLocks noChangeAspect="1"/>
+          </p:cNvPicPr>
+          <p:nvPr/>
+        </p:nvPicPr>
+        <p:blipFill>
+          <a:blip r:embed="rId2"/>
+          <a:stretch>
+            <a:fillRect/>
+          </a:stretch>
+        </p:blipFill>
+        <p:spPr>
+          <a:xfrm>
+            <a:off x="478804" y="781230"/>
+            <a:ext cx="5334000" cy="4000500"/>
+          </a:xfrm>
+          <a:prstGeom prst="rect">
+            <a:avLst/>
+          </a:prstGeom>
+        </p:spPr>
+      </p:pic>
+      <p:pic>
+        <p:nvPicPr>
+          <p:cNvPr id="13" name="Picture 12">
+            <a:extLst>
+              <a:ext uri="{FF2B5EF4-FFF2-40B4-BE49-F238E27FC236}">
+                <a16:creationId xmlns:a16="http://schemas.microsoft.com/office/drawing/2014/main" id="{265437B3-C0CD-7008-09A6-142A196F5A77}"/>
+              </a:ext>
+            </a:extLst>
+          </p:cNvPr>
+          <p:cNvPicPr>
+            <a:picLocks noChangeAspect="1"/>
+          </p:cNvPicPr>
+          <p:nvPr/>
+        </p:nvPicPr>
+        <p:blipFill>
+          <a:blip r:embed="rId3"/>
+          <a:stretch>
+            <a:fillRect/>
+          </a:stretch>
+        </p:blipFill>
+        <p:spPr>
+          <a:xfrm>
+            <a:off x="6265323" y="933809"/>
+            <a:ext cx="5334000" cy="4000500"/>
+          </a:xfrm>
+          <a:prstGeom prst="rect">
+            <a:avLst/>
+          </a:prstGeom>
+        </p:spPr>
+      </p:pic>
+    </p:spTree>
+    <p:extLst>
+      <p:ext uri="{BB962C8B-B14F-4D97-AF65-F5344CB8AC3E}">
+        <p14:creationId xmlns:p14="http://schemas.microsoft.com/office/powerpoint/2010/main" val="3536977533"/>
+      </p:ext>
+    </p:extLst>
+  </p:cSld>
+  <p:clrMapOvr>
+    <a:masterClrMapping/>
+  </p:clrMapOvr>
+  <p:transition spd="med"/>
 </p:sld>
 </file>
 

</xml_diff>

<commit_message>
Add osla-host directory for code
WIP getting it to compile and adding the new commands in
</commit_message>
<xml_diff>
--- a/info/how-to-usrp.pptx
+++ b/info/how-to-usrp.pptx
@@ -5,7 +5,7 @@
     <p:sldMasterId id="2147483648" r:id="rId1"/>
   </p:sldMasterIdLst>
   <p:notesMasterIdLst>
-    <p:notesMasterId r:id="rId28"/>
+    <p:notesMasterId r:id="rId29"/>
   </p:notesMasterIdLst>
   <p:sldIdLst>
     <p:sldId id="256" r:id="rId2"/>
@@ -30,10 +30,11 @@
     <p:sldId id="344" r:id="rId21"/>
     <p:sldId id="853" r:id="rId22"/>
     <p:sldId id="331" r:id="rId23"/>
-    <p:sldId id="340" r:id="rId24"/>
-    <p:sldId id="322" r:id="rId25"/>
-    <p:sldId id="851" r:id="rId26"/>
-    <p:sldId id="852" r:id="rId27"/>
+    <p:sldId id="855" r:id="rId24"/>
+    <p:sldId id="340" r:id="rId25"/>
+    <p:sldId id="322" r:id="rId26"/>
+    <p:sldId id="851" r:id="rId27"/>
+    <p:sldId id="852" r:id="rId28"/>
   </p:sldIdLst>
   <p:sldSz cx="12192000" cy="6858000"/>
   <p:notesSz cx="6858000" cy="9144000"/>
@@ -171,6 +172,11 @@
         <p14:section name="Untitled Section" id="{1AE6D1B1-034F-41C5-8AA9-246E86385608}">
           <p14:sldIdLst>
             <p14:sldId id="331"/>
+          </p14:sldIdLst>
+        </p14:section>
+        <p14:section name="Make" id="{17F22DFD-60F2-452C-9AAD-3BF4144E04ED}">
+          <p14:sldIdLst>
+            <p14:sldId id="855"/>
             <p14:sldId id="340"/>
             <p14:sldId id="322"/>
             <p14:sldId id="851"/>
@@ -268,7 +274,7 @@
           <a:p>
             <a:fld id="{7A71371E-0AB0-4E1B-9F79-83C8F32365BE}" type="datetimeFigureOut">
               <a:rPr lang="en-US" smtClean="0"/>
-              <a:t>12/5/2023</a:t>
+              <a:t>12/6/2023</a:t>
             </a:fld>
             <a:endParaRPr lang="en-US"/>
           </a:p>
@@ -657,6 +663,221 @@
 </p:notes>
 </file>
 
+<file path=ppt/notesSlides/notesSlide10.xml><?xml version="1.0" encoding="utf-8"?>
+<p:notes xmlns:a="http://schemas.openxmlformats.org/drawingml/2006/main" xmlns:r="http://schemas.openxmlformats.org/officeDocument/2006/relationships" xmlns:p="http://schemas.openxmlformats.org/presentationml/2006/main">
+  <p:cSld>
+    <p:spTree>
+      <p:nvGrpSpPr>
+        <p:cNvPr id="1" name=""/>
+        <p:cNvGrpSpPr/>
+        <p:nvPr/>
+      </p:nvGrpSpPr>
+      <p:grpSpPr>
+        <a:xfrm>
+          <a:off x="0" y="0"/>
+          <a:ext cx="0" cy="0"/>
+          <a:chOff x="0" y="0"/>
+          <a:chExt cx="0" cy="0"/>
+        </a:xfrm>
+      </p:grpSpPr>
+      <p:sp>
+        <p:nvSpPr>
+          <p:cNvPr id="2" name="Slide Image Placeholder 1"/>
+          <p:cNvSpPr>
+            <a:spLocks noGrp="1" noRot="1" noChangeAspect="1"/>
+          </p:cNvSpPr>
+          <p:nvPr>
+            <p:ph type="sldImg"/>
+          </p:nvPr>
+        </p:nvSpPr>
+        <p:spPr/>
+      </p:sp>
+      <p:sp>
+        <p:nvSpPr>
+          <p:cNvPr id="3" name="Notes Placeholder 2"/>
+          <p:cNvSpPr>
+            <a:spLocks noGrp="1"/>
+          </p:cNvSpPr>
+          <p:nvPr>
+            <p:ph type="body" idx="1"/>
+          </p:nvPr>
+        </p:nvSpPr>
+        <p:spPr/>
+        <p:txBody>
+          <a:bodyPr/>
+          <a:lstStyle/>
+          <a:p>
+            <a:pPr marL="0" marR="0" lvl="0" indent="0" algn="l" defTabSz="914400" rtl="0" eaLnBrk="1" fontAlgn="auto" latinLnBrk="0" hangingPunct="1">
+              <a:lnSpc>
+                <a:spcPct val="100000"/>
+              </a:lnSpc>
+              <a:spcBef>
+                <a:spcPts val="0"/>
+              </a:spcBef>
+              <a:spcAft>
+                <a:spcPts val="0"/>
+              </a:spcAft>
+              <a:buClrTx/>
+              <a:buSzTx/>
+              <a:buFontTx/>
+              <a:buNone/>
+              <a:tabLst/>
+              <a:defRPr/>
+            </a:pPr>
+            <a:r>
+              <a:rPr lang="en-US" dirty="0">
+                <a:hlinkClick r:id="rId3"/>
+              </a:rPr>
+              <a:t>https://github.com/EttusResearch/uhd/blob/master/fpga/usrp3/top/x300/Makefile.x300.inc</a:t>
+            </a:r>
+            <a:r>
+              <a:rPr lang="en-US" dirty="0"/>
+              <a:t> </a:t>
+            </a:r>
+          </a:p>
+          <a:p>
+            <a:endParaRPr lang="en-US" dirty="0"/>
+          </a:p>
+        </p:txBody>
+      </p:sp>
+      <p:sp>
+        <p:nvSpPr>
+          <p:cNvPr id="4" name="Slide Number Placeholder 3"/>
+          <p:cNvSpPr>
+            <a:spLocks noGrp="1"/>
+          </p:cNvSpPr>
+          <p:nvPr>
+            <p:ph type="sldNum" sz="quarter" idx="5"/>
+          </p:nvPr>
+        </p:nvSpPr>
+        <p:spPr/>
+        <p:txBody>
+          <a:bodyPr/>
+          <a:lstStyle/>
+          <a:p>
+            <a:fld id="{CAA19DDD-B1BD-4DBB-A1A9-366082CC542B}" type="slidenum">
+              <a:rPr lang="en-US" smtClean="0"/>
+              <a:t>23</a:t>
+            </a:fld>
+            <a:endParaRPr lang="en-US"/>
+          </a:p>
+        </p:txBody>
+      </p:sp>
+    </p:spTree>
+    <p:extLst>
+      <p:ext uri="{BB962C8B-B14F-4D97-AF65-F5344CB8AC3E}">
+        <p14:creationId xmlns:p14="http://schemas.microsoft.com/office/powerpoint/2010/main" val="1581599489"/>
+      </p:ext>
+    </p:extLst>
+  </p:cSld>
+  <p:clrMapOvr>
+    <a:masterClrMapping/>
+  </p:clrMapOvr>
+</p:notes>
+</file>
+
+<file path=ppt/notesSlides/notesSlide11.xml><?xml version="1.0" encoding="utf-8"?>
+<p:notes xmlns:a="http://schemas.openxmlformats.org/drawingml/2006/main" xmlns:r="http://schemas.openxmlformats.org/officeDocument/2006/relationships" xmlns:p="http://schemas.openxmlformats.org/presentationml/2006/main">
+  <p:cSld>
+    <p:spTree>
+      <p:nvGrpSpPr>
+        <p:cNvPr id="1" name=""/>
+        <p:cNvGrpSpPr/>
+        <p:nvPr/>
+      </p:nvGrpSpPr>
+      <p:grpSpPr>
+        <a:xfrm>
+          <a:off x="0" y="0"/>
+          <a:ext cx="0" cy="0"/>
+          <a:chOff x="0" y="0"/>
+          <a:chExt cx="0" cy="0"/>
+        </a:xfrm>
+      </p:grpSpPr>
+      <p:sp>
+        <p:nvSpPr>
+          <p:cNvPr id="2" name="Slide Image Placeholder 1"/>
+          <p:cNvSpPr>
+            <a:spLocks noGrp="1" noRot="1" noChangeAspect="1"/>
+          </p:cNvSpPr>
+          <p:nvPr>
+            <p:ph type="sldImg"/>
+          </p:nvPr>
+        </p:nvSpPr>
+        <p:spPr/>
+      </p:sp>
+      <p:sp>
+        <p:nvSpPr>
+          <p:cNvPr id="3" name="Notes Placeholder 2"/>
+          <p:cNvSpPr>
+            <a:spLocks noGrp="1"/>
+          </p:cNvSpPr>
+          <p:nvPr>
+            <p:ph type="body" idx="1"/>
+          </p:nvPr>
+        </p:nvSpPr>
+        <p:spPr/>
+        <p:txBody>
+          <a:bodyPr/>
+          <a:lstStyle/>
+          <a:p>
+            <a:r>
+              <a:rPr lang="en-US" dirty="0"/>
+              <a:t>https://github.com/Wangstonn/ww_uhd/blob/osla-bpsk-4.5/fpga/usrp3/top/x300/vlsi_make.sh</a:t>
+            </a:r>
+          </a:p>
+          <a:p>
+            <a:r>
+              <a:rPr lang="en-US" dirty="0"/>
+              <a:t>usrp_load.sh</a:t>
+            </a:r>
+          </a:p>
+          <a:p>
+            <a:r>
+              <a:rPr lang="en-US" dirty="0"/>
+              <a:t>mv_bitfile.sh</a:t>
+            </a:r>
+          </a:p>
+          <a:p>
+            <a:endParaRPr lang="en-US" dirty="0"/>
+          </a:p>
+        </p:txBody>
+      </p:sp>
+      <p:sp>
+        <p:nvSpPr>
+          <p:cNvPr id="4" name="Slide Number Placeholder 3"/>
+          <p:cNvSpPr>
+            <a:spLocks noGrp="1"/>
+          </p:cNvSpPr>
+          <p:nvPr>
+            <p:ph type="sldNum" sz="quarter" idx="5"/>
+          </p:nvPr>
+        </p:nvSpPr>
+        <p:spPr/>
+        <p:txBody>
+          <a:bodyPr/>
+          <a:lstStyle/>
+          <a:p>
+            <a:fld id="{CAA19DDD-B1BD-4DBB-A1A9-366082CC542B}" type="slidenum">
+              <a:rPr lang="en-US" smtClean="0"/>
+              <a:t>24</a:t>
+            </a:fld>
+            <a:endParaRPr lang="en-US"/>
+          </a:p>
+        </p:txBody>
+      </p:sp>
+    </p:spTree>
+    <p:extLst>
+      <p:ext uri="{BB962C8B-B14F-4D97-AF65-F5344CB8AC3E}">
+        <p14:creationId xmlns:p14="http://schemas.microsoft.com/office/powerpoint/2010/main" val="3403927886"/>
+      </p:ext>
+    </p:extLst>
+  </p:cSld>
+  <p:clrMapOvr>
+    <a:masterClrMapping/>
+  </p:clrMapOvr>
+</p:notes>
+</file>
+
 <file path=ppt/notesSlides/notesSlide2.xml><?xml version="1.0" encoding="utf-8"?>
 <p:notes xmlns:a="http://schemas.openxmlformats.org/drawingml/2006/main" xmlns:r="http://schemas.openxmlformats.org/officeDocument/2006/relationships" xmlns:p="http://schemas.openxmlformats.org/presentationml/2006/main">
   <p:cSld>
@@ -1506,7 +1727,7 @@
           <a:p>
             <a:fld id="{8C8B827B-D727-48E9-881C-E759228D42E3}" type="datetimeFigureOut">
               <a:rPr lang="en-US" smtClean="0"/>
-              <a:t>12/5/2023</a:t>
+              <a:t>12/6/2023</a:t>
             </a:fld>
             <a:endParaRPr lang="en-US"/>
           </a:p>
@@ -1704,7 +1925,7 @@
           <a:p>
             <a:fld id="{8C8B827B-D727-48E9-881C-E759228D42E3}" type="datetimeFigureOut">
               <a:rPr lang="en-US" smtClean="0"/>
-              <a:t>12/5/2023</a:t>
+              <a:t>12/6/2023</a:t>
             </a:fld>
             <a:endParaRPr lang="en-US"/>
           </a:p>
@@ -1912,7 +2133,7 @@
           <a:p>
             <a:fld id="{8C8B827B-D727-48E9-881C-E759228D42E3}" type="datetimeFigureOut">
               <a:rPr lang="en-US" smtClean="0"/>
-              <a:t>12/5/2023</a:t>
+              <a:t>12/6/2023</a:t>
             </a:fld>
             <a:endParaRPr lang="en-US"/>
           </a:p>
@@ -2395,7 +2616,7 @@
           <a:p>
             <a:fld id="{8C8B827B-D727-48E9-881C-E759228D42E3}" type="datetimeFigureOut">
               <a:rPr lang="en-US" smtClean="0"/>
-              <a:t>12/5/2023</a:t>
+              <a:t>12/6/2023</a:t>
             </a:fld>
             <a:endParaRPr lang="en-US"/>
           </a:p>
@@ -2670,7 +2891,7 @@
           <a:p>
             <a:fld id="{8C8B827B-D727-48E9-881C-E759228D42E3}" type="datetimeFigureOut">
               <a:rPr lang="en-US" smtClean="0"/>
-              <a:t>12/5/2023</a:t>
+              <a:t>12/6/2023</a:t>
             </a:fld>
             <a:endParaRPr lang="en-US"/>
           </a:p>
@@ -2935,7 +3156,7 @@
           <a:p>
             <a:fld id="{8C8B827B-D727-48E9-881C-E759228D42E3}" type="datetimeFigureOut">
               <a:rPr lang="en-US" smtClean="0"/>
-              <a:t>12/5/2023</a:t>
+              <a:t>12/6/2023</a:t>
             </a:fld>
             <a:endParaRPr lang="en-US"/>
           </a:p>
@@ -3347,7 +3568,7 @@
           <a:p>
             <a:fld id="{8C8B827B-D727-48E9-881C-E759228D42E3}" type="datetimeFigureOut">
               <a:rPr lang="en-US" smtClean="0"/>
-              <a:t>12/5/2023</a:t>
+              <a:t>12/6/2023</a:t>
             </a:fld>
             <a:endParaRPr lang="en-US"/>
           </a:p>
@@ -3488,7 +3709,7 @@
           <a:p>
             <a:fld id="{8C8B827B-D727-48E9-881C-E759228D42E3}" type="datetimeFigureOut">
               <a:rPr lang="en-US" smtClean="0"/>
-              <a:t>12/5/2023</a:t>
+              <a:t>12/6/2023</a:t>
             </a:fld>
             <a:endParaRPr lang="en-US"/>
           </a:p>
@@ -3601,7 +3822,7 @@
           <a:p>
             <a:fld id="{8C8B827B-D727-48E9-881C-E759228D42E3}" type="datetimeFigureOut">
               <a:rPr lang="en-US" smtClean="0"/>
-              <a:t>12/5/2023</a:t>
+              <a:t>12/6/2023</a:t>
             </a:fld>
             <a:endParaRPr lang="en-US"/>
           </a:p>
@@ -3912,7 +4133,7 @@
           <a:p>
             <a:fld id="{8C8B827B-D727-48E9-881C-E759228D42E3}" type="datetimeFigureOut">
               <a:rPr lang="en-US" smtClean="0"/>
-              <a:t>12/5/2023</a:t>
+              <a:t>12/6/2023</a:t>
             </a:fld>
             <a:endParaRPr lang="en-US"/>
           </a:p>
@@ -4200,7 +4421,7 @@
           <a:p>
             <a:fld id="{8C8B827B-D727-48E9-881C-E759228D42E3}" type="datetimeFigureOut">
               <a:rPr lang="en-US" smtClean="0"/>
-              <a:t>12/5/2023</a:t>
+              <a:t>12/6/2023</a:t>
             </a:fld>
             <a:endParaRPr lang="en-US"/>
           </a:p>
@@ -4441,7 +4662,7 @@
           <a:p>
             <a:fld id="{8C8B827B-D727-48E9-881C-E759228D42E3}" type="datetimeFigureOut">
               <a:rPr lang="en-US" smtClean="0"/>
-              <a:t>12/5/2023</a:t>
+              <a:t>12/6/2023</a:t>
             </a:fld>
             <a:endParaRPr lang="en-US"/>
           </a:p>
@@ -5203,7 +5424,9 @@
         </p:nvSpPr>
         <p:spPr/>
         <p:txBody>
-          <a:bodyPr/>
+          <a:bodyPr>
+            <a:normAutofit lnSpcReduction="10000"/>
+          </a:bodyPr>
           <a:lstStyle/>
           <a:p>
             <a:r>
@@ -5235,8 +5458,13 @@
             <a:pPr lvl="1"/>
             <a:r>
               <a:rPr lang="en-US" dirty="0"/>
-              <a:t>module</a:t>
-            </a:r>
+              <a:t>module </a:t>
+            </a:r>
+            <a:r>
+              <a:rPr lang="en-US" dirty="0" err="1"/>
+              <a:t>hdl</a:t>
+            </a:r>
+            <a:endParaRPr lang="en-US" dirty="0"/>
           </a:p>
           <a:p>
             <a:pPr lvl="1"/>
@@ -5254,9 +5482,34 @@
             <a:endParaRPr lang="en-US" dirty="0"/>
           </a:p>
           <a:p>
+            <a:pPr lvl="1"/>
+            <a:r>
+              <a:rPr lang="en-US" dirty="0" err="1"/>
+              <a:t>Makefile.srcs</a:t>
+            </a:r>
+            <a:r>
+              <a:rPr lang="en-US" dirty="0"/>
+              <a:t> (more on this later)</a:t>
+            </a:r>
+          </a:p>
+          <a:p>
             <a:r>
               <a:rPr lang="en-US" dirty="0"/>
               <a:t>TODO: try using packages instead of #include</a:t>
+            </a:r>
+          </a:p>
+          <a:p>
+            <a:r>
+              <a:rPr lang="en-US" dirty="0"/>
+              <a:t>Advice: Don’t use global params because the </a:t>
+            </a:r>
+            <a:r>
+              <a:rPr lang="en-US" dirty="0" err="1"/>
+              <a:t>sys_defs.svh</a:t>
+            </a:r>
+            <a:r>
+              <a:rPr lang="en-US" dirty="0"/>
+              <a:t> file will cause a lot of compilation heartache</a:t>
             </a:r>
           </a:p>
         </p:txBody>
@@ -7147,7 +7400,7 @@
           <p:cNvPr id="2" name="Title 1">
             <a:extLst>
               <a:ext uri="{FF2B5EF4-FFF2-40B4-BE49-F238E27FC236}">
-                <a16:creationId xmlns:a16="http://schemas.microsoft.com/office/drawing/2014/main" id="{D078B0CE-F18C-2F17-AF69-3E236D3AEA45}"/>
+                <a16:creationId xmlns:a16="http://schemas.microsoft.com/office/drawing/2014/main" id="{D938DE1B-4987-7195-DB8D-8907B5DE7D81}"/>
               </a:ext>
             </a:extLst>
           </p:cNvPr>
@@ -7163,7 +7416,14 @@
           <a:bodyPr/>
           <a:lstStyle/>
           <a:p>
-            <a:endParaRPr lang="en-US"/>
+            <a:r>
+              <a:rPr lang="en-US" dirty="0" err="1"/>
+              <a:t>Makefile</a:t>
+            </a:r>
+            <a:r>
+              <a:rPr lang="en-US" dirty="0"/>
+              <a:t> setup</a:t>
+            </a:r>
           </a:p>
         </p:txBody>
       </p:sp>
@@ -7172,7 +7432,7 @@
           <p:cNvPr id="3" name="Content Placeholder 2">
             <a:extLst>
               <a:ext uri="{FF2B5EF4-FFF2-40B4-BE49-F238E27FC236}">
-                <a16:creationId xmlns:a16="http://schemas.microsoft.com/office/drawing/2014/main" id="{8158A2A7-97C4-1EE3-BD3F-1C1DEA1ECE7D}"/>
+                <a16:creationId xmlns:a16="http://schemas.microsoft.com/office/drawing/2014/main" id="{DD57B83D-44A1-EDAA-4C84-DCA7435F80DE}"/>
               </a:ext>
             </a:extLst>
           </p:cNvPr>
@@ -7185,44 +7445,128 @@
         </p:nvSpPr>
         <p:spPr/>
         <p:txBody>
-          <a:bodyPr/>
-          <a:lstStyle/>
-          <a:p>
-            <a:r>
-              <a:rPr lang="en-US" dirty="0"/>
-              <a:t>Compilation:</a:t>
-            </a:r>
-          </a:p>
-          <a:p>
-            <a:pPr marL="457200" lvl="1" indent="0">
+          <a:bodyPr>
+            <a:normAutofit lnSpcReduction="10000"/>
+          </a:bodyPr>
+          <a:lstStyle/>
+          <a:p>
+            <a:pPr marL="0" indent="0">
               <a:buNone/>
             </a:pPr>
             <a:r>
-              <a:rPr lang="en-US" dirty="0">
-                <a:hlinkClick r:id="rId2"/>
-              </a:rPr>
-              <a:t>https://github.com/EttusResearch/uhd/blob/master/fpga/usrp3/top/x300/Makefile.x300.inc</a:t>
-            </a:r>
-            <a:r>
-              <a:rPr lang="en-US" dirty="0"/>
-              <a:t> </a:t>
-            </a:r>
-          </a:p>
-          <a:p>
-            <a:pPr marL="457200" lvl="1" indent="0">
+              <a:rPr lang="en-US" dirty="0"/>
+              <a:t>To compile the HDL, the </a:t>
+            </a:r>
+            <a:r>
+              <a:rPr lang="en-US" dirty="0" err="1"/>
+              <a:t>makefile</a:t>
+            </a:r>
+            <a:r>
+              <a:rPr lang="en-US" dirty="0"/>
+              <a:t> needs to know which files are needed. This is done by reading </a:t>
+            </a:r>
+            <a:r>
+              <a:rPr lang="en-US" dirty="0" err="1"/>
+              <a:t>makefile.srcs</a:t>
+            </a:r>
+            <a:r>
+              <a:rPr lang="en-US" dirty="0"/>
+              <a:t> files, which contain a list of all </a:t>
+            </a:r>
+            <a:r>
+              <a:rPr lang="en-US" dirty="0" err="1"/>
+              <a:t>hdl</a:t>
+            </a:r>
+            <a:r>
+              <a:rPr lang="en-US" dirty="0"/>
+              <a:t> code we use.</a:t>
+            </a:r>
+          </a:p>
+          <a:p>
+            <a:pPr marL="0" indent="0">
               <a:buNone/>
             </a:pPr>
             <a:r>
               <a:rPr lang="en-US" dirty="0"/>
-              <a:t>Contains the </a:t>
+              <a:t>In each module folder, add a </a:t>
             </a:r>
             <a:r>
               <a:rPr lang="en-US" dirty="0" err="1"/>
-              <a:t>makefiles</a:t>
-            </a:r>
-            <a:r>
-              <a:rPr lang="en-US" dirty="0"/>
-              <a:t> needed to compile the project</a:t>
+              <a:t>Makefile.srcs</a:t>
+            </a:r>
+            <a:r>
+              <a:rPr lang="en-US" dirty="0"/>
+              <a:t> file that </a:t>
+            </a:r>
+          </a:p>
+          <a:p>
+            <a:pPr lvl="1"/>
+            <a:r>
+              <a:rPr lang="en-US" dirty="0"/>
+              <a:t>Adds all utility files</a:t>
+            </a:r>
+          </a:p>
+          <a:p>
+            <a:pPr lvl="1"/>
+            <a:r>
+              <a:rPr lang="en-US" dirty="0"/>
+              <a:t>Adds the full paths to each of the </a:t>
+            </a:r>
+            <a:r>
+              <a:rPr lang="en-US" dirty="0" err="1"/>
+              <a:t>hdl</a:t>
+            </a:r>
+            <a:r>
+              <a:rPr lang="en-US" dirty="0"/>
+              <a:t> files</a:t>
+            </a:r>
+          </a:p>
+          <a:p>
+            <a:pPr marL="0" indent="0">
+              <a:buNone/>
+            </a:pPr>
+            <a:r>
+              <a:rPr lang="en-US" dirty="0"/>
+              <a:t>In the top module folder </a:t>
+            </a:r>
+            <a:r>
+              <a:rPr lang="en-US" dirty="0" err="1"/>
+              <a:t>Makefile</a:t>
+            </a:r>
+            <a:r>
+              <a:rPr lang="en-US" dirty="0"/>
+              <a:t>, add all the files that are being used. To add this </a:t>
+            </a:r>
+            <a:r>
+              <a:rPr lang="en-US" dirty="0" err="1"/>
+              <a:t>Makefile</a:t>
+            </a:r>
+            <a:r>
+              <a:rPr lang="en-US" dirty="0"/>
+              <a:t>, include the path to the </a:t>
+            </a:r>
+            <a:r>
+              <a:rPr lang="en-US" dirty="0" err="1"/>
+              <a:t>Makefile.srcs</a:t>
+            </a:r>
+            <a:r>
+              <a:rPr lang="en-US" dirty="0"/>
+              <a:t> and append the path string to DESIGN_SRCS</a:t>
+            </a:r>
+          </a:p>
+          <a:p>
+            <a:pPr marL="0" indent="0">
+              <a:buNone/>
+            </a:pPr>
+            <a:r>
+              <a:rPr lang="en-US" dirty="0">
+                <a:hlinkClick r:id="rId3"/>
+              </a:rPr>
+              <a:t>https://github.com/Wangstonn/ww_uhd/blob/osla-bpsk-4.5/fpga/usrp3/top/x300/Makefile.x300.inc</a:t>
+            </a:r>
+            <a:r>
+              <a:rPr lang="en-US" dirty="0"/>
+              <a:t> </a:t>
             </a:r>
           </a:p>
           <a:p>
@@ -7233,7 +7577,7 @@
     </p:spTree>
     <p:extLst>
       <p:ext uri="{BB962C8B-B14F-4D97-AF65-F5344CB8AC3E}">
-        <p14:creationId xmlns:p14="http://schemas.microsoft.com/office/powerpoint/2010/main" val="4009249910"/>
+        <p14:creationId xmlns:p14="http://schemas.microsoft.com/office/powerpoint/2010/main" val="1910499077"/>
       </p:ext>
     </p:extLst>
   </p:cSld>
@@ -7265,6 +7609,296 @@
           <p:cNvPr id="2" name="Title 1">
             <a:extLst>
               <a:ext uri="{FF2B5EF4-FFF2-40B4-BE49-F238E27FC236}">
+                <a16:creationId xmlns:a16="http://schemas.microsoft.com/office/drawing/2014/main" id="{D078B0CE-F18C-2F17-AF69-3E236D3AEA45}"/>
+              </a:ext>
+            </a:extLst>
+          </p:cNvPr>
+          <p:cNvSpPr>
+            <a:spLocks noGrp="1"/>
+          </p:cNvSpPr>
+          <p:nvPr>
+            <p:ph type="title"/>
+          </p:nvPr>
+        </p:nvSpPr>
+        <p:spPr/>
+        <p:txBody>
+          <a:bodyPr/>
+          <a:lstStyle/>
+          <a:p>
+            <a:r>
+              <a:rPr lang="en-US" dirty="0"/>
+              <a:t>Compilation/</a:t>
+            </a:r>
+            <a:r>
+              <a:rPr lang="en-US" dirty="0" err="1"/>
+              <a:t>bitfile</a:t>
+            </a:r>
+            <a:r>
+              <a:rPr lang="en-US" dirty="0"/>
+              <a:t> generation</a:t>
+            </a:r>
+          </a:p>
+        </p:txBody>
+      </p:sp>
+      <p:sp>
+        <p:nvSpPr>
+          <p:cNvPr id="3" name="Content Placeholder 2">
+            <a:extLst>
+              <a:ext uri="{FF2B5EF4-FFF2-40B4-BE49-F238E27FC236}">
+                <a16:creationId xmlns:a16="http://schemas.microsoft.com/office/drawing/2014/main" id="{8158A2A7-97C4-1EE3-BD3F-1C1DEA1ECE7D}"/>
+              </a:ext>
+            </a:extLst>
+          </p:cNvPr>
+          <p:cNvSpPr>
+            <a:spLocks noGrp="1"/>
+          </p:cNvSpPr>
+          <p:nvPr>
+            <p:ph idx="1"/>
+          </p:nvPr>
+        </p:nvSpPr>
+        <p:spPr/>
+        <p:txBody>
+          <a:bodyPr>
+            <a:normAutofit fontScale="85000" lnSpcReduction="20000"/>
+          </a:bodyPr>
+          <a:lstStyle/>
+          <a:p>
+            <a:pPr marL="0" indent="0">
+              <a:buNone/>
+            </a:pPr>
+            <a:r>
+              <a:rPr lang="en-US" dirty="0"/>
+              <a:t>module load python/3.8.5</a:t>
+            </a:r>
+          </a:p>
+          <a:p>
+            <a:pPr marL="0" indent="0">
+              <a:buNone/>
+            </a:pPr>
+            <a:r>
+              <a:rPr lang="en-US" dirty="0"/>
+              <a:t>. ./setupenv.sh --</a:t>
+            </a:r>
+            <a:r>
+              <a:rPr lang="en-US" dirty="0" err="1"/>
+              <a:t>vivado</a:t>
+            </a:r>
+            <a:r>
+              <a:rPr lang="en-US" dirty="0"/>
+              <a:t>-path /</a:t>
+            </a:r>
+            <a:r>
+              <a:rPr lang="en-US" dirty="0" err="1"/>
+              <a:t>usr</a:t>
+            </a:r>
+            <a:r>
+              <a:rPr lang="en-US" dirty="0"/>
+              <a:t>/</a:t>
+            </a:r>
+            <a:r>
+              <a:rPr lang="en-US" dirty="0" err="1"/>
+              <a:t>caen</a:t>
+            </a:r>
+            <a:r>
+              <a:rPr lang="en-US" dirty="0"/>
+              <a:t>/</a:t>
+            </a:r>
+            <a:r>
+              <a:rPr lang="en-US" dirty="0" err="1"/>
+              <a:t>xilinx</a:t>
+            </a:r>
+            <a:r>
+              <a:rPr lang="en-US" dirty="0"/>
+              <a:t>/2021.1/</a:t>
+            </a:r>
+            <a:r>
+              <a:rPr lang="en-US" dirty="0" err="1"/>
+              <a:t>Vivado</a:t>
+            </a:r>
+            <a:r>
+              <a:rPr lang="en-US" dirty="0"/>
+              <a:t>/</a:t>
+            </a:r>
+          </a:p>
+          <a:p>
+            <a:pPr marL="0" indent="0">
+              <a:buNone/>
+            </a:pPr>
+            <a:r>
+              <a:rPr lang="en-US" dirty="0"/>
+              <a:t>make X310_HG</a:t>
+            </a:r>
+          </a:p>
+          <a:p>
+            <a:pPr marL="0" indent="0">
+              <a:buNone/>
+            </a:pPr>
+            <a:r>
+              <a:rPr lang="en-US" dirty="0" err="1"/>
+              <a:t>vivado</a:t>
+            </a:r>
+            <a:r>
+              <a:rPr lang="en-US" dirty="0"/>
+              <a:t> path will change based on </a:t>
+            </a:r>
+            <a:r>
+              <a:rPr lang="en-US" dirty="0" err="1"/>
+              <a:t>uhd</a:t>
+            </a:r>
+            <a:r>
+              <a:rPr lang="en-US" dirty="0"/>
+              <a:t> version</a:t>
+            </a:r>
+          </a:p>
+          <a:p>
+            <a:pPr marL="0" indent="0">
+              <a:buNone/>
+            </a:pPr>
+            <a:r>
+              <a:rPr lang="en-US" dirty="0">
+                <a:hlinkClick r:id="rId3"/>
+              </a:rPr>
+              <a:t>https://github.com/Wangstonn/ww_uhd/blob/osla-bpsk-4.5/fpga/usrp3/top/x300/vlsi_make.sh</a:t>
+            </a:r>
+            <a:r>
+              <a:rPr lang="en-US" dirty="0"/>
+              <a:t> </a:t>
+            </a:r>
+          </a:p>
+          <a:p>
+            <a:pPr marL="0" indent="0">
+              <a:buNone/>
+            </a:pPr>
+            <a:endParaRPr lang="en-US" dirty="0"/>
+          </a:p>
+          <a:p>
+            <a:pPr marL="0" indent="0">
+              <a:buNone/>
+            </a:pPr>
+            <a:r>
+              <a:rPr lang="en-US" dirty="0"/>
+              <a:t>To record </a:t>
+            </a:r>
+            <a:r>
+              <a:rPr lang="en-US" dirty="0" err="1"/>
+              <a:t>bitfile</a:t>
+            </a:r>
+            <a:r>
+              <a:rPr lang="en-US" dirty="0"/>
+              <a:t> in </a:t>
+            </a:r>
+            <a:r>
+              <a:rPr lang="en-US" dirty="0" err="1"/>
+              <a:t>github</a:t>
+            </a:r>
+            <a:r>
+              <a:rPr lang="en-US" dirty="0"/>
+              <a:t> commit</a:t>
+            </a:r>
+          </a:p>
+          <a:p>
+            <a:pPr marL="0" indent="0">
+              <a:buNone/>
+            </a:pPr>
+            <a:r>
+              <a:rPr lang="en-US" dirty="0"/>
+              <a:t>mv build/usrp_x310_fpga_HG.bit ./usrp_x310_fpga_HG.bit </a:t>
+            </a:r>
+          </a:p>
+          <a:p>
+            <a:pPr marL="0" indent="0">
+              <a:buNone/>
+            </a:pPr>
+            <a:r>
+              <a:rPr lang="en-US" dirty="0"/>
+              <a:t>To load onto USRP: go to lab </a:t>
+            </a:r>
+            <a:r>
+              <a:rPr lang="en-US" dirty="0" err="1"/>
+              <a:t>compuer</a:t>
+            </a:r>
+            <a:endParaRPr lang="en-US" dirty="0"/>
+          </a:p>
+          <a:p>
+            <a:pPr marL="0" indent="0">
+              <a:buNone/>
+            </a:pPr>
+            <a:r>
+              <a:rPr lang="en-US" dirty="0" err="1"/>
+              <a:t>uhd_image_loader</a:t>
+            </a:r>
+            <a:r>
+              <a:rPr lang="en-US" dirty="0"/>
+              <a:t> --</a:t>
+            </a:r>
+            <a:r>
+              <a:rPr lang="en-US" dirty="0" err="1"/>
+              <a:t>args</a:t>
+            </a:r>
+            <a:r>
+              <a:rPr lang="en-US" dirty="0"/>
+              <a:t> type=x300 </a:t>
+            </a:r>
+            <a:r>
+              <a:rPr lang="en-US" dirty="0" err="1"/>
+              <a:t>addr</a:t>
+            </a:r>
+            <a:r>
+              <a:rPr lang="en-US" dirty="0"/>
+              <a:t>=192.168.110.2 --</a:t>
+            </a:r>
+            <a:r>
+              <a:rPr lang="en-US" dirty="0" err="1"/>
+              <a:t>fpga</a:t>
+            </a:r>
+            <a:r>
+              <a:rPr lang="en-US" dirty="0"/>
+              <a:t>-path usrp_x310_fpga_HG.bit</a:t>
+            </a:r>
+          </a:p>
+          <a:p>
+            <a:pPr marL="0" indent="0">
+              <a:buNone/>
+            </a:pPr>
+            <a:endParaRPr lang="en-US" dirty="0"/>
+          </a:p>
+        </p:txBody>
+      </p:sp>
+    </p:spTree>
+    <p:extLst>
+      <p:ext uri="{BB962C8B-B14F-4D97-AF65-F5344CB8AC3E}">
+        <p14:creationId xmlns:p14="http://schemas.microsoft.com/office/powerpoint/2010/main" val="4009249910"/>
+      </p:ext>
+    </p:extLst>
+  </p:cSld>
+  <p:clrMapOvr>
+    <a:masterClrMapping/>
+  </p:clrMapOvr>
+</p:sld>
+</file>
+
+<file path=ppt/slides/slide25.xml><?xml version="1.0" encoding="utf-8"?>
+<p:sld xmlns:a="http://schemas.openxmlformats.org/drawingml/2006/main" xmlns:r="http://schemas.openxmlformats.org/officeDocument/2006/relationships" xmlns:p="http://schemas.openxmlformats.org/presentationml/2006/main">
+  <p:cSld>
+    <p:spTree>
+      <p:nvGrpSpPr>
+        <p:cNvPr id="1" name=""/>
+        <p:cNvGrpSpPr/>
+        <p:nvPr/>
+      </p:nvGrpSpPr>
+      <p:grpSpPr>
+        <a:xfrm>
+          <a:off x="0" y="0"/>
+          <a:ext cx="0" cy="0"/>
+          <a:chOff x="0" y="0"/>
+          <a:chExt cx="0" cy="0"/>
+        </a:xfrm>
+      </p:grpSpPr>
+      <p:sp>
+        <p:nvSpPr>
+          <p:cNvPr id="2" name="Title 1">
+            <a:extLst>
+              <a:ext uri="{FF2B5EF4-FFF2-40B4-BE49-F238E27FC236}">
                 <a16:creationId xmlns:a16="http://schemas.microsoft.com/office/drawing/2014/main" id="{120A129F-F3CA-63BC-A582-27486C38D717}"/>
               </a:ext>
             </a:extLst>
@@ -7399,7 +8033,7 @@
 </p:sld>
 </file>
 
-<file path=ppt/slides/slide25.xml><?xml version="1.0" encoding="utf-8"?>
+<file path=ppt/slides/slide26.xml><?xml version="1.0" encoding="utf-8"?>
 <p:sld xmlns:a="http://schemas.openxmlformats.org/drawingml/2006/main" xmlns:r="http://schemas.openxmlformats.org/officeDocument/2006/relationships" xmlns:p="http://schemas.openxmlformats.org/presentationml/2006/main">
   <p:cSld>
     <p:spTree>
@@ -7811,7 +8445,7 @@
 </p:sld>
 </file>
 
-<file path=ppt/slides/slide26.xml><?xml version="1.0" encoding="utf-8"?>
+<file path=ppt/slides/slide27.xml><?xml version="1.0" encoding="utf-8"?>
 <p:sld xmlns:a="http://schemas.openxmlformats.org/drawingml/2006/main" xmlns:r="http://schemas.openxmlformats.org/officeDocument/2006/relationships" xmlns:p="http://schemas.openxmlformats.org/presentationml/2006/main">
   <p:cSld>
     <p:spTree>

</xml_diff>